<commit_message>
poster fixes - final
</commit_message>
<xml_diff>
--- a/presentation/Fred_Berendse_poster.pptx
+++ b/presentation/Fred_Berendse_poster.pptx
@@ -34,7 +34,7 @@
       </p:grpSpPr>
       <p:sp>
         <p:nvSpPr>
-          <p:cNvPr id="42" name="PlaceHolder 1"/>
+          <p:cNvPr id="40" name="PlaceHolder 1"/>
           <p:cNvSpPr>
             <a:spLocks noGrp="1"/>
           </p:cNvSpPr>
@@ -71,7 +71,7 @@
       </p:sp>
       <p:sp>
         <p:nvSpPr>
-          <p:cNvPr id="43" name="PlaceHolder 2"/>
+          <p:cNvPr id="41" name="PlaceHolder 2"/>
           <p:cNvSpPr>
             <a:spLocks noGrp="1"/>
           </p:cNvSpPr>
@@ -107,7 +107,7 @@
       </p:sp>
       <p:sp>
         <p:nvSpPr>
-          <p:cNvPr id="44" name="PlaceHolder 3"/>
+          <p:cNvPr id="42" name="PlaceHolder 3"/>
           <p:cNvSpPr>
             <a:spLocks noGrp="1"/>
           </p:cNvSpPr>
@@ -133,7 +133,7 @@
               <a:rPr b="0" lang="en-US" sz="1400" spc="-1" strike="noStrike">
                 <a:latin typeface="Times New Roman"/>
               </a:rPr>
-              <a:t> </a:t>
+              <a:t>&lt;header&gt;</a:t>
             </a:r>
             <a:endParaRPr b="0" lang="en-US" sz="1400" spc="-1" strike="noStrike">
               <a:latin typeface="Times New Roman"/>
@@ -143,7 +143,7 @@
       </p:sp>
       <p:sp>
         <p:nvSpPr>
-          <p:cNvPr id="45" name="PlaceHolder 4"/>
+          <p:cNvPr id="43" name="PlaceHolder 4"/>
           <p:cNvSpPr>
             <a:spLocks noGrp="1"/>
           </p:cNvSpPr>
@@ -170,7 +170,7 @@
               <a:rPr b="0" lang="en-US" sz="1400" spc="-1" strike="noStrike">
                 <a:latin typeface="Times New Roman"/>
               </a:rPr>
-              <a:t> </a:t>
+              <a:t>&lt;date/time&gt;</a:t>
             </a:r>
             <a:endParaRPr b="0" lang="en-US" sz="1400" spc="-1" strike="noStrike">
               <a:latin typeface="Times New Roman"/>
@@ -180,7 +180,7 @@
       </p:sp>
       <p:sp>
         <p:nvSpPr>
-          <p:cNvPr id="46" name="PlaceHolder 5"/>
+          <p:cNvPr id="44" name="PlaceHolder 5"/>
           <p:cNvSpPr>
             <a:spLocks noGrp="1"/>
           </p:cNvSpPr>
@@ -206,7 +206,7 @@
               <a:rPr b="0" lang="en-US" sz="1400" spc="-1" strike="noStrike">
                 <a:latin typeface="Times New Roman"/>
               </a:rPr>
-              <a:t> </a:t>
+              <a:t>&lt;footer&gt;</a:t>
             </a:r>
             <a:endParaRPr b="0" lang="en-US" sz="1400" spc="-1" strike="noStrike">
               <a:latin typeface="Times New Roman"/>
@@ -216,7 +216,7 @@
       </p:sp>
       <p:sp>
         <p:nvSpPr>
-          <p:cNvPr id="47" name="PlaceHolder 6"/>
+          <p:cNvPr id="45" name="PlaceHolder 6"/>
           <p:cNvSpPr>
             <a:spLocks noGrp="1"/>
           </p:cNvSpPr>
@@ -239,11 +239,11 @@
           </a:bodyPr>
           <a:p>
             <a:pPr algn="r"/>
-            <a:fld id="{17AC5FC6-1C76-4C62-9D58-031170B628F0}" type="slidenum">
+            <a:fld id="{1F41C718-669A-4002-A2AF-905704C956F4}" type="slidenum">
               <a:rPr b="0" lang="en-US" sz="1400" spc="-1" strike="noStrike">
                 <a:latin typeface="Times New Roman"/>
               </a:rPr>
-              <a:t>1</a:t>
+              <a:t>&lt;number&gt;</a:t>
             </a:fld>
             <a:endParaRPr b="0" lang="en-US" sz="1400" spc="-1" strike="noStrike">
               <a:latin typeface="Times New Roman"/>
@@ -276,14 +276,14 @@
       </p:grpSpPr>
       <p:sp>
         <p:nvSpPr>
-          <p:cNvPr id="103" name="CustomShape 1"/>
+          <p:cNvPr id="101" name="CustomShape 1"/>
           <p:cNvSpPr/>
           <p:nvPr/>
         </p:nvSpPr>
         <p:spPr>
           <a:xfrm>
             <a:off x="3884760" y="8685360"/>
-            <a:ext cx="2969640" cy="455040"/>
+            <a:ext cx="2969280" cy="454680"/>
           </a:xfrm>
           <a:prstGeom prst="rect">
             <a:avLst/>
@@ -309,7 +309,7 @@
                 <a:spcPct val="100000"/>
               </a:lnSpc>
             </a:pPr>
-            <a:fld id="{812D978E-B52F-4424-8E90-E34F67B89673}" type="slidenum">
+            <a:fld id="{ECE32AAB-8C79-40D2-9B0C-C7AABF8452F3}" type="slidenum">
               <a:rPr b="0" lang="en-US" sz="1200" spc="-1" strike="noStrike">
                 <a:solidFill>
                   <a:srgbClr val="000000"/>
@@ -326,7 +326,7 @@
       </p:sp>
       <p:sp>
         <p:nvSpPr>
-          <p:cNvPr id="104" name="PlaceHolder 2"/>
+          <p:cNvPr id="102" name="PlaceHolder 2"/>
           <p:cNvSpPr>
             <a:spLocks noGrp="1"/>
           </p:cNvSpPr>
@@ -337,16 +337,16 @@
         <p:spPr>
           <a:xfrm>
             <a:off x="1143000" y="685800"/>
-            <a:ext cx="4569840" cy="3426840"/>
-          </a:xfrm>
-          <a:prstGeom prst="rect">
-            <a:avLst/>
-          </a:prstGeom>
-        </p:spPr>
-      </p:sp>
-      <p:sp>
-        <p:nvSpPr>
-          <p:cNvPr id="105" name="PlaceHolder 3"/>
+            <a:ext cx="4569480" cy="3426480"/>
+          </a:xfrm>
+          <a:prstGeom prst="rect">
+            <a:avLst/>
+          </a:prstGeom>
+        </p:spPr>
+      </p:sp>
+      <p:sp>
+        <p:nvSpPr>
+          <p:cNvPr id="103" name="PlaceHolder 3"/>
           <p:cNvSpPr>
             <a:spLocks noGrp="1"/>
           </p:cNvSpPr>
@@ -357,7 +357,7 @@
         <p:spPr>
           <a:xfrm>
             <a:off x="685800" y="4343400"/>
-            <a:ext cx="5484240" cy="4112640"/>
+            <a:ext cx="5483880" cy="4112280"/>
           </a:xfrm>
           <a:prstGeom prst="rect">
             <a:avLst/>
@@ -420,7 +420,7 @@
       </p:grpSpPr>
       <p:sp>
         <p:nvSpPr>
-          <p:cNvPr id="27" name="PlaceHolder 1"/>
+          <p:cNvPr id="25" name="PlaceHolder 1"/>
           <p:cNvSpPr>
             <a:spLocks noGrp="1"/>
           </p:cNvSpPr>
@@ -451,7 +451,7 @@
       </p:sp>
       <p:sp>
         <p:nvSpPr>
-          <p:cNvPr id="28" name="PlaceHolder 2"/>
+          <p:cNvPr id="26" name="PlaceHolder 2"/>
           <p:cNvSpPr>
             <a:spLocks noGrp="1"/>
           </p:cNvSpPr>
@@ -481,7 +481,7 @@
       </p:sp>
       <p:sp>
         <p:nvSpPr>
-          <p:cNvPr id="29" name="PlaceHolder 3"/>
+          <p:cNvPr id="27" name="PlaceHolder 3"/>
           <p:cNvSpPr>
             <a:spLocks noGrp="1"/>
           </p:cNvSpPr>
@@ -533,7 +533,7 @@
       </p:grpSpPr>
       <p:sp>
         <p:nvSpPr>
-          <p:cNvPr id="30" name="PlaceHolder 1"/>
+          <p:cNvPr id="28" name="PlaceHolder 1"/>
           <p:cNvSpPr>
             <a:spLocks noGrp="1"/>
           </p:cNvSpPr>
@@ -564,7 +564,7 @@
       </p:sp>
       <p:sp>
         <p:nvSpPr>
-          <p:cNvPr id="31" name="PlaceHolder 2"/>
+          <p:cNvPr id="29" name="PlaceHolder 2"/>
           <p:cNvSpPr>
             <a:spLocks noGrp="1"/>
           </p:cNvSpPr>
@@ -594,7 +594,7 @@
       </p:sp>
       <p:sp>
         <p:nvSpPr>
-          <p:cNvPr id="32" name="PlaceHolder 3"/>
+          <p:cNvPr id="30" name="PlaceHolder 3"/>
           <p:cNvSpPr>
             <a:spLocks noGrp="1"/>
           </p:cNvSpPr>
@@ -624,7 +624,7 @@
       </p:sp>
       <p:sp>
         <p:nvSpPr>
-          <p:cNvPr id="33" name="PlaceHolder 4"/>
+          <p:cNvPr id="31" name="PlaceHolder 4"/>
           <p:cNvSpPr>
             <a:spLocks noGrp="1"/>
           </p:cNvSpPr>
@@ -654,7 +654,7 @@
       </p:sp>
       <p:sp>
         <p:nvSpPr>
-          <p:cNvPr id="34" name="PlaceHolder 5"/>
+          <p:cNvPr id="32" name="PlaceHolder 5"/>
           <p:cNvSpPr>
             <a:spLocks noGrp="1"/>
           </p:cNvSpPr>
@@ -706,7 +706,7 @@
       </p:grpSpPr>
       <p:sp>
         <p:nvSpPr>
-          <p:cNvPr id="35" name="PlaceHolder 1"/>
+          <p:cNvPr id="33" name="PlaceHolder 1"/>
           <p:cNvSpPr>
             <a:spLocks noGrp="1"/>
           </p:cNvSpPr>
@@ -737,7 +737,7 @@
       </p:sp>
       <p:sp>
         <p:nvSpPr>
-          <p:cNvPr id="36" name="PlaceHolder 2"/>
+          <p:cNvPr id="34" name="PlaceHolder 2"/>
           <p:cNvSpPr>
             <a:spLocks noGrp="1"/>
           </p:cNvSpPr>
@@ -767,7 +767,7 @@
       </p:sp>
       <p:sp>
         <p:nvSpPr>
-          <p:cNvPr id="37" name="PlaceHolder 3"/>
+          <p:cNvPr id="35" name="PlaceHolder 3"/>
           <p:cNvSpPr>
             <a:spLocks noGrp="1"/>
           </p:cNvSpPr>
@@ -797,7 +797,7 @@
       </p:sp>
       <p:sp>
         <p:nvSpPr>
-          <p:cNvPr id="38" name="PlaceHolder 4"/>
+          <p:cNvPr id="36" name="PlaceHolder 4"/>
           <p:cNvSpPr>
             <a:spLocks noGrp="1"/>
           </p:cNvSpPr>
@@ -827,7 +827,7 @@
       </p:sp>
       <p:sp>
         <p:nvSpPr>
-          <p:cNvPr id="39" name="PlaceHolder 5"/>
+          <p:cNvPr id="37" name="PlaceHolder 5"/>
           <p:cNvSpPr>
             <a:spLocks noGrp="1"/>
           </p:cNvSpPr>
@@ -857,7 +857,7 @@
       </p:sp>
       <p:sp>
         <p:nvSpPr>
-          <p:cNvPr id="40" name="PlaceHolder 6"/>
+          <p:cNvPr id="38" name="PlaceHolder 6"/>
           <p:cNvSpPr>
             <a:spLocks noGrp="1"/>
           </p:cNvSpPr>
@@ -887,7 +887,7 @@
       </p:sp>
       <p:sp>
         <p:nvSpPr>
-          <p:cNvPr id="41" name="PlaceHolder 7"/>
+          <p:cNvPr id="39" name="PlaceHolder 7"/>
           <p:cNvSpPr>
             <a:spLocks noGrp="1"/>
           </p:cNvSpPr>
@@ -939,7 +939,7 @@
       </p:grpSpPr>
       <p:sp>
         <p:nvSpPr>
-          <p:cNvPr id="6" name="PlaceHolder 1"/>
+          <p:cNvPr id="4" name="PlaceHolder 1"/>
           <p:cNvSpPr>
             <a:spLocks noGrp="1"/>
           </p:cNvSpPr>
@@ -970,7 +970,7 @@
       </p:sp>
       <p:sp>
         <p:nvSpPr>
-          <p:cNvPr id="7" name="PlaceHolder 2"/>
+          <p:cNvPr id="5" name="PlaceHolder 2"/>
           <p:cNvSpPr>
             <a:spLocks noGrp="1"/>
           </p:cNvSpPr>
@@ -1023,7 +1023,7 @@
       </p:grpSpPr>
       <p:sp>
         <p:nvSpPr>
-          <p:cNvPr id="8" name="PlaceHolder 1"/>
+          <p:cNvPr id="6" name="PlaceHolder 1"/>
           <p:cNvSpPr>
             <a:spLocks noGrp="1"/>
           </p:cNvSpPr>
@@ -1054,7 +1054,7 @@
       </p:sp>
       <p:sp>
         <p:nvSpPr>
-          <p:cNvPr id="9" name="PlaceHolder 2"/>
+          <p:cNvPr id="7" name="PlaceHolder 2"/>
           <p:cNvSpPr>
             <a:spLocks noGrp="1"/>
           </p:cNvSpPr>
@@ -1106,7 +1106,7 @@
       </p:grpSpPr>
       <p:sp>
         <p:nvSpPr>
-          <p:cNvPr id="10" name="PlaceHolder 1"/>
+          <p:cNvPr id="8" name="PlaceHolder 1"/>
           <p:cNvSpPr>
             <a:spLocks noGrp="1"/>
           </p:cNvSpPr>
@@ -1137,7 +1137,7 @@
       </p:sp>
       <p:sp>
         <p:nvSpPr>
-          <p:cNvPr id="11" name="PlaceHolder 2"/>
+          <p:cNvPr id="9" name="PlaceHolder 2"/>
           <p:cNvSpPr>
             <a:spLocks noGrp="1"/>
           </p:cNvSpPr>
@@ -1167,7 +1167,7 @@
       </p:sp>
       <p:sp>
         <p:nvSpPr>
-          <p:cNvPr id="12" name="PlaceHolder 3"/>
+          <p:cNvPr id="10" name="PlaceHolder 3"/>
           <p:cNvSpPr>
             <a:spLocks noGrp="1"/>
           </p:cNvSpPr>
@@ -1219,7 +1219,7 @@
       </p:grpSpPr>
       <p:sp>
         <p:nvSpPr>
-          <p:cNvPr id="13" name="PlaceHolder 1"/>
+          <p:cNvPr id="11" name="PlaceHolder 1"/>
           <p:cNvSpPr>
             <a:spLocks noGrp="1"/>
           </p:cNvSpPr>
@@ -1272,7 +1272,7 @@
       </p:grpSpPr>
       <p:sp>
         <p:nvSpPr>
-          <p:cNvPr id="14" name="PlaceHolder 1"/>
+          <p:cNvPr id="12" name="PlaceHolder 1"/>
           <p:cNvSpPr>
             <a:spLocks noGrp="1"/>
           </p:cNvSpPr>
@@ -1325,7 +1325,7 @@
       </p:grpSpPr>
       <p:sp>
         <p:nvSpPr>
-          <p:cNvPr id="15" name="PlaceHolder 1"/>
+          <p:cNvPr id="13" name="PlaceHolder 1"/>
           <p:cNvSpPr>
             <a:spLocks noGrp="1"/>
           </p:cNvSpPr>
@@ -1356,7 +1356,7 @@
       </p:sp>
       <p:sp>
         <p:nvSpPr>
-          <p:cNvPr id="16" name="PlaceHolder 2"/>
+          <p:cNvPr id="14" name="PlaceHolder 2"/>
           <p:cNvSpPr>
             <a:spLocks noGrp="1"/>
           </p:cNvSpPr>
@@ -1386,7 +1386,7 @@
       </p:sp>
       <p:sp>
         <p:nvSpPr>
-          <p:cNvPr id="17" name="PlaceHolder 3"/>
+          <p:cNvPr id="15" name="PlaceHolder 3"/>
           <p:cNvSpPr>
             <a:spLocks noGrp="1"/>
           </p:cNvSpPr>
@@ -1416,7 +1416,7 @@
       </p:sp>
       <p:sp>
         <p:nvSpPr>
-          <p:cNvPr id="18" name="PlaceHolder 4"/>
+          <p:cNvPr id="16" name="PlaceHolder 4"/>
           <p:cNvSpPr>
             <a:spLocks noGrp="1"/>
           </p:cNvSpPr>
@@ -1468,7 +1468,7 @@
       </p:grpSpPr>
       <p:sp>
         <p:nvSpPr>
-          <p:cNvPr id="19" name="PlaceHolder 1"/>
+          <p:cNvPr id="17" name="PlaceHolder 1"/>
           <p:cNvSpPr>
             <a:spLocks noGrp="1"/>
           </p:cNvSpPr>
@@ -1499,7 +1499,7 @@
       </p:sp>
       <p:sp>
         <p:nvSpPr>
-          <p:cNvPr id="20" name="PlaceHolder 2"/>
+          <p:cNvPr id="18" name="PlaceHolder 2"/>
           <p:cNvSpPr>
             <a:spLocks noGrp="1"/>
           </p:cNvSpPr>
@@ -1529,7 +1529,7 @@
       </p:sp>
       <p:sp>
         <p:nvSpPr>
-          <p:cNvPr id="21" name="PlaceHolder 3"/>
+          <p:cNvPr id="19" name="PlaceHolder 3"/>
           <p:cNvSpPr>
             <a:spLocks noGrp="1"/>
           </p:cNvSpPr>
@@ -1559,7 +1559,7 @@
       </p:sp>
       <p:sp>
         <p:nvSpPr>
-          <p:cNvPr id="22" name="PlaceHolder 4"/>
+          <p:cNvPr id="20" name="PlaceHolder 4"/>
           <p:cNvSpPr>
             <a:spLocks noGrp="1"/>
           </p:cNvSpPr>
@@ -1611,7 +1611,7 @@
       </p:grpSpPr>
       <p:sp>
         <p:nvSpPr>
-          <p:cNvPr id="23" name="PlaceHolder 1"/>
+          <p:cNvPr id="21" name="PlaceHolder 1"/>
           <p:cNvSpPr>
             <a:spLocks noGrp="1"/>
           </p:cNvSpPr>
@@ -1642,7 +1642,7 @@
       </p:sp>
       <p:sp>
         <p:nvSpPr>
-          <p:cNvPr id="24" name="PlaceHolder 2"/>
+          <p:cNvPr id="22" name="PlaceHolder 2"/>
           <p:cNvSpPr>
             <a:spLocks noGrp="1"/>
           </p:cNvSpPr>
@@ -1672,7 +1672,7 @@
       </p:sp>
       <p:sp>
         <p:nvSpPr>
-          <p:cNvPr id="25" name="PlaceHolder 3"/>
+          <p:cNvPr id="23" name="PlaceHolder 3"/>
           <p:cNvSpPr>
             <a:spLocks noGrp="1"/>
           </p:cNvSpPr>
@@ -1702,7 +1702,7 @@
       </p:sp>
       <p:sp>
         <p:nvSpPr>
-          <p:cNvPr id="26" name="PlaceHolder 4"/>
+          <p:cNvPr id="24" name="PlaceHolder 4"/>
           <p:cNvSpPr>
             <a:spLocks noGrp="1"/>
           </p:cNvSpPr>
@@ -1771,8 +1771,8 @@
         </p:blipFill>
         <p:spPr>
           <a:xfrm rot="16200000">
-            <a:off x="-9245520" y="16461360"/>
-            <a:ext cx="15364800" cy="1559880"/>
+            <a:off x="-9245520" y="16461720"/>
+            <a:ext cx="15364440" cy="1559520"/>
           </a:xfrm>
           <a:prstGeom prst="rect">
             <a:avLst/>
@@ -1794,8 +1794,8 @@
         </p:blipFill>
         <p:spPr>
           <a:xfrm rot="5400000">
-            <a:off x="37771920" y="16459200"/>
-            <a:ext cx="15364800" cy="1559880"/>
+            <a:off x="37772280" y="16459200"/>
+            <a:ext cx="15364440" cy="1559520"/>
           </a:xfrm>
           <a:prstGeom prst="rect">
             <a:avLst/>
@@ -1818,7 +1818,7 @@
         <p:spPr>
           <a:xfrm>
             <a:off x="57240" y="33426360"/>
-            <a:ext cx="43774920" cy="2017080"/>
+            <a:ext cx="43774560" cy="2016720"/>
           </a:xfrm>
           <a:prstGeom prst="rect">
             <a:avLst/>
@@ -1837,7 +1837,7 @@
         <p:spPr>
           <a:xfrm>
             <a:off x="57240" y="33998040"/>
-            <a:ext cx="21943440" cy="1267920"/>
+            <a:ext cx="21943080" cy="1267560"/>
           </a:xfrm>
           <a:prstGeom prst="rect">
             <a:avLst/>
@@ -1882,426 +1882,6 @@
               <a:t>Template ID: greenapple  Size: 36x48</a:t>
             </a:r>
             <a:endParaRPr b="0" lang="en-US" sz="6360" spc="-1" strike="noStrike">
-              <a:latin typeface="Arial"/>
-            </a:endParaRPr>
-          </a:p>
-        </p:txBody>
-      </p:sp>
-      <p:sp>
-        <p:nvSpPr>
-          <p:cNvPr id="4" name="PlaceHolder 2"/>
-          <p:cNvSpPr>
-            <a:spLocks noGrp="1"/>
-          </p:cNvSpPr>
-          <p:nvPr>
-            <p:ph type="title"/>
-          </p:nvPr>
-        </p:nvSpPr>
-        <p:spPr>
-          <a:xfrm>
-            <a:off x="2194560" y="1313280"/>
-            <a:ext cx="39501720" cy="5496840"/>
-          </a:xfrm>
-          <a:prstGeom prst="rect">
-            <a:avLst/>
-          </a:prstGeom>
-        </p:spPr>
-        <p:txBody>
-          <a:bodyPr lIns="0" rIns="0" tIns="0" bIns="0" anchor="ctr">
-            <a:noAutofit/>
-          </a:bodyPr>
-          <a:p>
-            <a:pPr algn="ctr"/>
-            <a:r>
-              <a:rPr b="0" lang="en-US" sz="4400" spc="-1" strike="noStrike">
-                <a:latin typeface="Arial"/>
-              </a:rPr>
-              <a:t>C</a:t>
-            </a:r>
-            <a:r>
-              <a:rPr b="0" lang="en-US" sz="4400" spc="-1" strike="noStrike">
-                <a:latin typeface="Arial"/>
-              </a:rPr>
-              <a:t>l</a:t>
-            </a:r>
-            <a:r>
-              <a:rPr b="0" lang="en-US" sz="4400" spc="-1" strike="noStrike">
-                <a:latin typeface="Arial"/>
-              </a:rPr>
-              <a:t>i</a:t>
-            </a:r>
-            <a:r>
-              <a:rPr b="0" lang="en-US" sz="4400" spc="-1" strike="noStrike">
-                <a:latin typeface="Arial"/>
-              </a:rPr>
-              <a:t>c</a:t>
-            </a:r>
-            <a:r>
-              <a:rPr b="0" lang="en-US" sz="4400" spc="-1" strike="noStrike">
-                <a:latin typeface="Arial"/>
-              </a:rPr>
-              <a:t>k</a:t>
-            </a:r>
-            <a:r>
-              <a:rPr b="0" lang="en-US" sz="4400" spc="-1" strike="noStrike">
-                <a:latin typeface="Arial"/>
-              </a:rPr>
-              <a:t> </a:t>
-            </a:r>
-            <a:r>
-              <a:rPr b="0" lang="en-US" sz="4400" spc="-1" strike="noStrike">
-                <a:latin typeface="Arial"/>
-              </a:rPr>
-              <a:t>t</a:t>
-            </a:r>
-            <a:r>
-              <a:rPr b="0" lang="en-US" sz="4400" spc="-1" strike="noStrike">
-                <a:latin typeface="Arial"/>
-              </a:rPr>
-              <a:t>o</a:t>
-            </a:r>
-            <a:r>
-              <a:rPr b="0" lang="en-US" sz="4400" spc="-1" strike="noStrike">
-                <a:latin typeface="Arial"/>
-              </a:rPr>
-              <a:t> </a:t>
-            </a:r>
-            <a:r>
-              <a:rPr b="0" lang="en-US" sz="4400" spc="-1" strike="noStrike">
-                <a:latin typeface="Arial"/>
-              </a:rPr>
-              <a:t>e</a:t>
-            </a:r>
-            <a:r>
-              <a:rPr b="0" lang="en-US" sz="4400" spc="-1" strike="noStrike">
-                <a:latin typeface="Arial"/>
-              </a:rPr>
-              <a:t>d</a:t>
-            </a:r>
-            <a:r>
-              <a:rPr b="0" lang="en-US" sz="4400" spc="-1" strike="noStrike">
-                <a:latin typeface="Arial"/>
-              </a:rPr>
-              <a:t>i</a:t>
-            </a:r>
-            <a:r>
-              <a:rPr b="0" lang="en-US" sz="4400" spc="-1" strike="noStrike">
-                <a:latin typeface="Arial"/>
-              </a:rPr>
-              <a:t>t</a:t>
-            </a:r>
-            <a:r>
-              <a:rPr b="0" lang="en-US" sz="4400" spc="-1" strike="noStrike">
-                <a:latin typeface="Arial"/>
-              </a:rPr>
-              <a:t> </a:t>
-            </a:r>
-            <a:r>
-              <a:rPr b="0" lang="en-US" sz="4400" spc="-1" strike="noStrike">
-                <a:latin typeface="Arial"/>
-              </a:rPr>
-              <a:t>t</a:t>
-            </a:r>
-            <a:r>
-              <a:rPr b="0" lang="en-US" sz="4400" spc="-1" strike="noStrike">
-                <a:latin typeface="Arial"/>
-              </a:rPr>
-              <a:t>h</a:t>
-            </a:r>
-            <a:r>
-              <a:rPr b="0" lang="en-US" sz="4400" spc="-1" strike="noStrike">
-                <a:latin typeface="Arial"/>
-              </a:rPr>
-              <a:t>e</a:t>
-            </a:r>
-            <a:r>
-              <a:rPr b="0" lang="en-US" sz="4400" spc="-1" strike="noStrike">
-                <a:latin typeface="Arial"/>
-              </a:rPr>
-              <a:t> </a:t>
-            </a:r>
-            <a:r>
-              <a:rPr b="0" lang="en-US" sz="4400" spc="-1" strike="noStrike">
-                <a:latin typeface="Arial"/>
-              </a:rPr>
-              <a:t>t</a:t>
-            </a:r>
-            <a:r>
-              <a:rPr b="0" lang="en-US" sz="4400" spc="-1" strike="noStrike">
-                <a:latin typeface="Arial"/>
-              </a:rPr>
-              <a:t>i</a:t>
-            </a:r>
-            <a:r>
-              <a:rPr b="0" lang="en-US" sz="4400" spc="-1" strike="noStrike">
-                <a:latin typeface="Arial"/>
-              </a:rPr>
-              <a:t>t</a:t>
-            </a:r>
-            <a:r>
-              <a:rPr b="0" lang="en-US" sz="4400" spc="-1" strike="noStrike">
-                <a:latin typeface="Arial"/>
-              </a:rPr>
-              <a:t>l</a:t>
-            </a:r>
-            <a:r>
-              <a:rPr b="0" lang="en-US" sz="4400" spc="-1" strike="noStrike">
-                <a:latin typeface="Arial"/>
-              </a:rPr>
-              <a:t>e</a:t>
-            </a:r>
-            <a:r>
-              <a:rPr b="0" lang="en-US" sz="4400" spc="-1" strike="noStrike">
-                <a:latin typeface="Arial"/>
-              </a:rPr>
-              <a:t> </a:t>
-            </a:r>
-            <a:r>
-              <a:rPr b="0" lang="en-US" sz="4400" spc="-1" strike="noStrike">
-                <a:latin typeface="Arial"/>
-              </a:rPr>
-              <a:t>t</a:t>
-            </a:r>
-            <a:r>
-              <a:rPr b="0" lang="en-US" sz="4400" spc="-1" strike="noStrike">
-                <a:latin typeface="Arial"/>
-              </a:rPr>
-              <a:t>e</a:t>
-            </a:r>
-            <a:r>
-              <a:rPr b="0" lang="en-US" sz="4400" spc="-1" strike="noStrike">
-                <a:latin typeface="Arial"/>
-              </a:rPr>
-              <a:t>x</a:t>
-            </a:r>
-            <a:r>
-              <a:rPr b="0" lang="en-US" sz="4400" spc="-1" strike="noStrike">
-                <a:latin typeface="Arial"/>
-              </a:rPr>
-              <a:t>t</a:t>
-            </a:r>
-            <a:r>
-              <a:rPr b="0" lang="en-US" sz="4400" spc="-1" strike="noStrike">
-                <a:latin typeface="Arial"/>
-              </a:rPr>
-              <a:t> </a:t>
-            </a:r>
-            <a:r>
-              <a:rPr b="0" lang="en-US" sz="4400" spc="-1" strike="noStrike">
-                <a:latin typeface="Arial"/>
-              </a:rPr>
-              <a:t>f</a:t>
-            </a:r>
-            <a:r>
-              <a:rPr b="0" lang="en-US" sz="4400" spc="-1" strike="noStrike">
-                <a:latin typeface="Arial"/>
-              </a:rPr>
-              <a:t>o</a:t>
-            </a:r>
-            <a:r>
-              <a:rPr b="0" lang="en-US" sz="4400" spc="-1" strike="noStrike">
-                <a:latin typeface="Arial"/>
-              </a:rPr>
-              <a:t>r</a:t>
-            </a:r>
-            <a:r>
-              <a:rPr b="0" lang="en-US" sz="4400" spc="-1" strike="noStrike">
-                <a:latin typeface="Arial"/>
-              </a:rPr>
-              <a:t>m</a:t>
-            </a:r>
-            <a:r>
-              <a:rPr b="0" lang="en-US" sz="4400" spc="-1" strike="noStrike">
-                <a:latin typeface="Arial"/>
-              </a:rPr>
-              <a:t>a</a:t>
-            </a:r>
-            <a:r>
-              <a:rPr b="0" lang="en-US" sz="4400" spc="-1" strike="noStrike">
-                <a:latin typeface="Arial"/>
-              </a:rPr>
-              <a:t>t</a:t>
-            </a:r>
-            <a:endParaRPr b="0" lang="en-US" sz="4400" spc="-1" strike="noStrike">
-              <a:latin typeface="Arial"/>
-            </a:endParaRPr>
-          </a:p>
-        </p:txBody>
-      </p:sp>
-      <p:sp>
-        <p:nvSpPr>
-          <p:cNvPr id="5" name="PlaceHolder 3"/>
-          <p:cNvSpPr>
-            <a:spLocks noGrp="1"/>
-          </p:cNvSpPr>
-          <p:nvPr>
-            <p:ph type="body"/>
-          </p:nvPr>
-        </p:nvSpPr>
-        <p:spPr>
-          <a:xfrm>
-            <a:off x="2194560" y="7702560"/>
-            <a:ext cx="39501720" cy="19092240"/>
-          </a:xfrm>
-          <a:prstGeom prst="rect">
-            <a:avLst/>
-          </a:prstGeom>
-        </p:spPr>
-        <p:txBody>
-          <a:bodyPr lIns="0" rIns="0" tIns="0" bIns="0">
-            <a:normAutofit/>
-          </a:bodyPr>
-          <a:p>
-            <a:pPr marL="432000" indent="-324000">
-              <a:spcBef>
-                <a:spcPts val="1417"/>
-              </a:spcBef>
-              <a:buClr>
-                <a:srgbClr val="000000"/>
-              </a:buClr>
-              <a:buSzPct val="45000"/>
-              <a:buFont typeface="Wingdings" charset="2"/>
-              <a:buChar char=""/>
-            </a:pPr>
-            <a:r>
-              <a:rPr b="0" lang="en-US" sz="3200" spc="-1" strike="noStrike">
-                <a:latin typeface="Arial"/>
-              </a:rPr>
-              <a:t>Click to edit the outline text format</a:t>
-            </a:r>
-            <a:endParaRPr b="0" lang="en-US" sz="3200" spc="-1" strike="noStrike">
-              <a:latin typeface="Arial"/>
-            </a:endParaRPr>
-          </a:p>
-          <a:p>
-            <a:pPr lvl="1" marL="864000" indent="-324000">
-              <a:spcBef>
-                <a:spcPts val="1134"/>
-              </a:spcBef>
-              <a:buClr>
-                <a:srgbClr val="000000"/>
-              </a:buClr>
-              <a:buSzPct val="75000"/>
-              <a:buFont typeface="Symbol" charset="2"/>
-              <a:buChar char=""/>
-            </a:pPr>
-            <a:r>
-              <a:rPr b="0" lang="en-US" sz="2800" spc="-1" strike="noStrike">
-                <a:latin typeface="Arial"/>
-              </a:rPr>
-              <a:t>Second Outline Level</a:t>
-            </a:r>
-            <a:endParaRPr b="0" lang="en-US" sz="2800" spc="-1" strike="noStrike">
-              <a:latin typeface="Arial"/>
-            </a:endParaRPr>
-          </a:p>
-          <a:p>
-            <a:pPr lvl="2" marL="1296000" indent="-288000">
-              <a:spcBef>
-                <a:spcPts val="850"/>
-              </a:spcBef>
-              <a:buClr>
-                <a:srgbClr val="000000"/>
-              </a:buClr>
-              <a:buSzPct val="45000"/>
-              <a:buFont typeface="Wingdings" charset="2"/>
-              <a:buChar char=""/>
-            </a:pPr>
-            <a:r>
-              <a:rPr b="0" lang="en-US" sz="2400" spc="-1" strike="noStrike">
-                <a:latin typeface="Arial"/>
-              </a:rPr>
-              <a:t>Third Outline Level</a:t>
-            </a:r>
-            <a:endParaRPr b="0" lang="en-US" sz="2400" spc="-1" strike="noStrike">
-              <a:latin typeface="Arial"/>
-            </a:endParaRPr>
-          </a:p>
-          <a:p>
-            <a:pPr lvl="3" marL="1728000" indent="-216000">
-              <a:spcBef>
-                <a:spcPts val="567"/>
-              </a:spcBef>
-              <a:buClr>
-                <a:srgbClr val="000000"/>
-              </a:buClr>
-              <a:buSzPct val="75000"/>
-              <a:buFont typeface="Symbol" charset="2"/>
-              <a:buChar char=""/>
-            </a:pPr>
-            <a:r>
-              <a:rPr b="0" lang="en-US" sz="2000" spc="-1" strike="noStrike">
-                <a:latin typeface="Arial"/>
-              </a:rPr>
-              <a:t>Fourth Outline Level</a:t>
-            </a:r>
-            <a:endParaRPr b="0" lang="en-US" sz="2000" spc="-1" strike="noStrike">
-              <a:latin typeface="Arial"/>
-            </a:endParaRPr>
-          </a:p>
-          <a:p>
-            <a:pPr lvl="4" marL="2160000" indent="-216000">
-              <a:spcBef>
-                <a:spcPts val="283"/>
-              </a:spcBef>
-              <a:buClr>
-                <a:srgbClr val="000000"/>
-              </a:buClr>
-              <a:buSzPct val="45000"/>
-              <a:buFont typeface="Wingdings" charset="2"/>
-              <a:buChar char=""/>
-            </a:pPr>
-            <a:r>
-              <a:rPr b="0" lang="en-US" sz="2000" spc="-1" strike="noStrike">
-                <a:latin typeface="Arial"/>
-              </a:rPr>
-              <a:t>Fifth Outline Level</a:t>
-            </a:r>
-            <a:endParaRPr b="0" lang="en-US" sz="2000" spc="-1" strike="noStrike">
-              <a:latin typeface="Arial"/>
-            </a:endParaRPr>
-          </a:p>
-          <a:p>
-            <a:pPr lvl="5" marL="2592000" indent="-216000">
-              <a:spcBef>
-                <a:spcPts val="283"/>
-              </a:spcBef>
-              <a:buClr>
-                <a:srgbClr val="000000"/>
-              </a:buClr>
-              <a:buSzPct val="45000"/>
-              <a:buFont typeface="Wingdings" charset="2"/>
-              <a:buChar char=""/>
-            </a:pPr>
-            <a:r>
-              <a:rPr b="0" lang="en-US" sz="2000" spc="-1" strike="noStrike">
-                <a:latin typeface="Arial"/>
-              </a:rPr>
-              <a:t>Sixth Outline Level</a:t>
-            </a:r>
-            <a:endParaRPr b="0" lang="en-US" sz="2000" spc="-1" strike="noStrike">
-              <a:latin typeface="Arial"/>
-            </a:endParaRPr>
-          </a:p>
-          <a:p>
-            <a:pPr lvl="6" marL="3024000" indent="-216000">
-              <a:spcBef>
-                <a:spcPts val="283"/>
-              </a:spcBef>
-              <a:buClr>
-                <a:srgbClr val="000000"/>
-              </a:buClr>
-              <a:buSzPct val="45000"/>
-              <a:buFont typeface="Wingdings" charset="2"/>
-              <a:buChar char=""/>
-            </a:pPr>
-            <a:r>
-              <a:rPr b="0" lang="en-US" sz="2000" spc="-1" strike="noStrike">
-                <a:latin typeface="Arial"/>
-              </a:rPr>
-              <a:t>Seventh Outline Level</a:t>
-            </a:r>
-            <a:endParaRPr b="0" lang="en-US" sz="2000" spc="-1" strike="noStrike">
               <a:latin typeface="Arial"/>
             </a:endParaRPr>
           </a:p>
@@ -2346,14 +1926,14 @@
       </p:grpSpPr>
       <p:sp>
         <p:nvSpPr>
-          <p:cNvPr id="48" name="CustomShape 1"/>
+          <p:cNvPr id="46" name="CustomShape 1"/>
           <p:cNvSpPr/>
           <p:nvPr/>
         </p:nvSpPr>
         <p:spPr>
           <a:xfrm>
             <a:off x="68400" y="76320"/>
-            <a:ext cx="43728840" cy="3884040"/>
+            <a:ext cx="43728480" cy="3883680"/>
           </a:xfrm>
           <a:prstGeom prst="rect">
             <a:avLst/>
@@ -2422,14 +2002,14 @@
       </p:sp>
       <p:sp>
         <p:nvSpPr>
-          <p:cNvPr id="49" name="CustomShape 2"/>
+          <p:cNvPr id="47" name="CustomShape 2"/>
           <p:cNvSpPr/>
           <p:nvPr/>
         </p:nvSpPr>
         <p:spPr>
           <a:xfrm>
             <a:off x="0" y="4343400"/>
-            <a:ext cx="10356120" cy="1026720"/>
+            <a:ext cx="10355760" cy="1026360"/>
           </a:xfrm>
           <a:prstGeom prst="rect">
             <a:avLst/>
@@ -2478,14 +2058,14 @@
       </p:sp>
       <p:sp>
         <p:nvSpPr>
-          <p:cNvPr id="50" name="CustomShape 3"/>
+          <p:cNvPr id="48" name="CustomShape 3"/>
           <p:cNvSpPr/>
           <p:nvPr/>
         </p:nvSpPr>
         <p:spPr>
           <a:xfrm>
             <a:off x="0" y="11179080"/>
-            <a:ext cx="10356120" cy="1026720"/>
+            <a:ext cx="10355760" cy="1026360"/>
           </a:xfrm>
           <a:prstGeom prst="rect">
             <a:avLst/>
@@ -2534,14 +2114,14 @@
       </p:sp>
       <p:sp>
         <p:nvSpPr>
-          <p:cNvPr id="51" name="CustomShape 4"/>
+          <p:cNvPr id="49" name="CustomShape 4"/>
           <p:cNvSpPr/>
           <p:nvPr/>
         </p:nvSpPr>
         <p:spPr>
           <a:xfrm>
             <a:off x="11177640" y="4343400"/>
-            <a:ext cx="10356120" cy="1026720"/>
+            <a:ext cx="10355760" cy="1026360"/>
           </a:xfrm>
           <a:prstGeom prst="rect">
             <a:avLst/>
@@ -2590,14 +2170,14 @@
       </p:sp>
       <p:sp>
         <p:nvSpPr>
-          <p:cNvPr id="52" name="CustomShape 5"/>
+          <p:cNvPr id="50" name="CustomShape 5"/>
           <p:cNvSpPr/>
           <p:nvPr/>
         </p:nvSpPr>
         <p:spPr>
           <a:xfrm>
             <a:off x="22355280" y="4343400"/>
-            <a:ext cx="10356120" cy="1026720"/>
+            <a:ext cx="10355760" cy="1026360"/>
           </a:xfrm>
           <a:prstGeom prst="rect">
             <a:avLst/>
@@ -2646,14 +2226,14 @@
       </p:sp>
       <p:sp>
         <p:nvSpPr>
-          <p:cNvPr id="53" name="CustomShape 6"/>
+          <p:cNvPr id="51" name="CustomShape 6"/>
           <p:cNvSpPr/>
           <p:nvPr/>
         </p:nvSpPr>
         <p:spPr>
           <a:xfrm>
             <a:off x="22131360" y="27592920"/>
-            <a:ext cx="10367280" cy="1026720"/>
+            <a:ext cx="10366920" cy="1026360"/>
           </a:xfrm>
           <a:prstGeom prst="rect">
             <a:avLst/>
@@ -2702,14 +2282,14 @@
       </p:sp>
       <p:sp>
         <p:nvSpPr>
-          <p:cNvPr id="54" name="CustomShape 7"/>
+          <p:cNvPr id="52" name="CustomShape 7"/>
           <p:cNvSpPr/>
           <p:nvPr/>
         </p:nvSpPr>
         <p:spPr>
           <a:xfrm>
             <a:off x="33431040" y="16642080"/>
-            <a:ext cx="10356120" cy="1026720"/>
+            <a:ext cx="10355760" cy="1026360"/>
           </a:xfrm>
           <a:prstGeom prst="rect">
             <a:avLst/>
@@ -2758,14 +2338,14 @@
       </p:sp>
       <p:sp>
         <p:nvSpPr>
-          <p:cNvPr id="55" name="CustomShape 8"/>
+          <p:cNvPr id="53" name="CustomShape 8"/>
           <p:cNvSpPr/>
           <p:nvPr/>
         </p:nvSpPr>
         <p:spPr>
           <a:xfrm>
             <a:off x="33442560" y="26816400"/>
-            <a:ext cx="10356120" cy="1026720"/>
+            <a:ext cx="10355760" cy="1026360"/>
           </a:xfrm>
           <a:prstGeom prst="rect">
             <a:avLst/>
@@ -2814,14 +2394,14 @@
       </p:sp>
       <p:sp>
         <p:nvSpPr>
-          <p:cNvPr id="56" name="CustomShape 9"/>
+          <p:cNvPr id="54" name="CustomShape 9"/>
           <p:cNvSpPr/>
           <p:nvPr/>
         </p:nvSpPr>
         <p:spPr>
           <a:xfrm>
             <a:off x="0" y="17695080"/>
-            <a:ext cx="10356120" cy="1026720"/>
+            <a:ext cx="10355760" cy="1026360"/>
           </a:xfrm>
           <a:prstGeom prst="rect">
             <a:avLst/>
@@ -2870,14 +2450,14 @@
       </p:sp>
       <p:sp>
         <p:nvSpPr>
-          <p:cNvPr id="57" name="CustomShape 10"/>
+          <p:cNvPr id="55" name="CustomShape 10"/>
           <p:cNvSpPr/>
           <p:nvPr/>
         </p:nvSpPr>
         <p:spPr>
           <a:xfrm>
             <a:off x="711360" y="5715000"/>
-            <a:ext cx="9446760" cy="5257800"/>
+            <a:ext cx="9446400" cy="5257800"/>
           </a:xfrm>
           <a:prstGeom prst="rect">
             <a:avLst/>
@@ -2914,7 +2494,7 @@
                 <a:latin typeface="Gill Sans"/>
                 <a:ea typeface="Arial"/>
               </a:rPr>
-              <a:t>Education is touted as the great equalizer that opens doors for the disenfranchised. For that reason, it is necessary to examine how our educational institutions, from pre-K to post-secondary, are facilitating (or hampering) the path toward equity.</a:t>
+              <a:t>Education is touted as the great equalizer that opens doors for the disenfranchised. For that reason, it is imperative to examine how our educational institutions, from pre-K to post-secondary, are facilitating (or hampering) the path toward equity.</a:t>
             </a:r>
             <a:endParaRPr b="0" lang="en-US" sz="4200" spc="-1" strike="noStrike">
               <a:latin typeface="Arial"/>
@@ -2924,14 +2504,14 @@
       </p:sp>
       <p:sp>
         <p:nvSpPr>
-          <p:cNvPr id="58" name="CustomShape 11"/>
+          <p:cNvPr id="56" name="CustomShape 11"/>
           <p:cNvSpPr/>
           <p:nvPr/>
         </p:nvSpPr>
         <p:spPr>
           <a:xfrm>
             <a:off x="11277720" y="5715000"/>
-            <a:ext cx="10209240" cy="1684080"/>
+            <a:ext cx="10208880" cy="1684080"/>
           </a:xfrm>
           <a:prstGeom prst="rect">
             <a:avLst/>
@@ -2952,7 +2532,7 @@
             <a:spAutoFit/>
           </a:bodyPr>
           <a:p>
-            <a:pPr marL="216000" indent="-214560">
+            <a:pPr marL="216000" indent="-214200">
               <a:lnSpc>
                 <a:spcPct val="100000"/>
               </a:lnSpc>
@@ -3006,14 +2586,14 @@
       </p:sp>
       <p:sp>
         <p:nvSpPr>
-          <p:cNvPr id="59" name="CustomShape 12"/>
+          <p:cNvPr id="57" name="CustomShape 12"/>
           <p:cNvSpPr/>
           <p:nvPr/>
         </p:nvSpPr>
         <p:spPr>
           <a:xfrm>
             <a:off x="-349200" y="11927880"/>
-            <a:ext cx="9954720" cy="5459400"/>
+            <a:ext cx="9954360" cy="5459400"/>
           </a:xfrm>
           <a:prstGeom prst="rect">
             <a:avLst/>
@@ -3047,7 +2627,7 @@
             </a:endParaRPr>
           </a:p>
           <a:p>
-            <a:pPr lvl="1" marL="1271520" indent="-412200">
+            <a:pPr lvl="1" marL="1271520" indent="-411840">
               <a:lnSpc>
                 <a:spcPct val="100000"/>
               </a:lnSpc>
@@ -3075,7 +2655,7 @@
             </a:endParaRPr>
           </a:p>
           <a:p>
-            <a:pPr lvl="1" marL="1271520" indent="-412200">
+            <a:pPr lvl="1" marL="1271520" indent="-411840">
               <a:lnSpc>
                 <a:spcPct val="100000"/>
               </a:lnSpc>
@@ -3106,14 +2686,14 @@
       </p:sp>
       <p:sp>
         <p:nvSpPr>
-          <p:cNvPr id="60" name="CustomShape 13"/>
+          <p:cNvPr id="58" name="CustomShape 13"/>
           <p:cNvSpPr/>
           <p:nvPr/>
         </p:nvSpPr>
         <p:spPr>
           <a:xfrm>
             <a:off x="33613920" y="17922240"/>
-            <a:ext cx="9964440" cy="1899720"/>
+            <a:ext cx="9964080" cy="1899720"/>
           </a:xfrm>
           <a:prstGeom prst="rect">
             <a:avLst/>
@@ -3147,7 +2727,7 @@
                 <a:latin typeface="Gill Sans"/>
                 <a:ea typeface="Arial"/>
               </a:rPr>
-              <a:t>All three models have similar RMSEs with Random Forest holding a slight edge in performance.</a:t>
+              <a:t>All three models have similar RMSEs with random forest holding a slight edge in performance.</a:t>
             </a:r>
             <a:endParaRPr b="0" lang="en-US" sz="3600" spc="-1" strike="noStrike">
               <a:latin typeface="Arial"/>
@@ -3157,14 +2737,14 @@
       </p:sp>
       <p:sp>
         <p:nvSpPr>
-          <p:cNvPr id="61" name="CustomShape 14"/>
+          <p:cNvPr id="59" name="CustomShape 14"/>
           <p:cNvSpPr/>
           <p:nvPr/>
         </p:nvSpPr>
         <p:spPr>
           <a:xfrm>
             <a:off x="22302000" y="12877200"/>
-            <a:ext cx="10340640" cy="2283840"/>
+            <a:ext cx="10340280" cy="2283480"/>
           </a:xfrm>
           <a:prstGeom prst="rect">
             <a:avLst/>
@@ -3231,7 +2811,7 @@
       </p:sp>
       <p:pic>
         <p:nvPicPr>
-          <p:cNvPr id="62" name="Picture 2" descr=""/>
+          <p:cNvPr id="60" name="Picture 2" descr=""/>
           <p:cNvPicPr/>
           <p:nvPr/>
         </p:nvPicPr>
@@ -3242,7 +2822,7 @@
         <p:spPr>
           <a:xfrm>
             <a:off x="838080" y="603000"/>
-            <a:ext cx="1521720" cy="2823840"/>
+            <a:ext cx="1521360" cy="2823480"/>
           </a:xfrm>
           <a:prstGeom prst="rect">
             <a:avLst/>
@@ -3254,7 +2834,7 @@
       </p:pic>
       <p:sp>
         <p:nvSpPr>
-          <p:cNvPr id="63" name="CustomShape 15"/>
+          <p:cNvPr id="61" name="CustomShape 15"/>
           <p:cNvSpPr/>
           <p:nvPr/>
         </p:nvSpPr>
@@ -3305,7 +2885,7 @@
       </p:sp>
       <p:pic>
         <p:nvPicPr>
-          <p:cNvPr id="64" name="Picture 387" descr=""/>
+          <p:cNvPr id="62" name="Picture 387" descr=""/>
           <p:cNvPicPr/>
           <p:nvPr/>
         </p:nvPicPr>
@@ -3316,7 +2896,7 @@
         <p:spPr>
           <a:xfrm>
             <a:off x="33022440" y="671400"/>
-            <a:ext cx="698040" cy="698040"/>
+            <a:ext cx="697680" cy="697680"/>
           </a:xfrm>
           <a:prstGeom prst="rect">
             <a:avLst/>
@@ -3328,7 +2908,7 @@
       </p:pic>
       <p:pic>
         <p:nvPicPr>
-          <p:cNvPr id="65" name="Picture 388" descr=""/>
+          <p:cNvPr id="63" name="Picture 388" descr=""/>
           <p:cNvPicPr/>
           <p:nvPr/>
         </p:nvPicPr>
@@ -3339,7 +2919,7 @@
         <p:spPr>
           <a:xfrm>
             <a:off x="33050160" y="2826720"/>
-            <a:ext cx="704160" cy="532440"/>
+            <a:ext cx="703800" cy="532080"/>
           </a:xfrm>
           <a:prstGeom prst="rect">
             <a:avLst/>
@@ -3351,14 +2931,14 @@
       </p:pic>
       <p:sp>
         <p:nvSpPr>
-          <p:cNvPr id="66" name="CustomShape 16"/>
+          <p:cNvPr id="64" name="CustomShape 16"/>
           <p:cNvSpPr/>
           <p:nvPr/>
         </p:nvSpPr>
         <p:spPr>
           <a:xfrm>
             <a:off x="33070680" y="1600200"/>
-            <a:ext cx="1293120" cy="912600"/>
+            <a:ext cx="1292760" cy="912600"/>
           </a:xfrm>
           <a:prstGeom prst="rect">
             <a:avLst/>
@@ -3402,7 +2982,7 @@
       </p:sp>
       <p:sp>
         <p:nvSpPr>
-          <p:cNvPr id="67" name="CustomShape 17"/>
+          <p:cNvPr id="65" name="CustomShape 17"/>
           <p:cNvSpPr/>
           <p:nvPr/>
         </p:nvSpPr>
@@ -3453,7 +3033,7 @@
       </p:sp>
       <p:sp>
         <p:nvSpPr>
-          <p:cNvPr id="68" name="CustomShape 18"/>
+          <p:cNvPr id="66" name="CustomShape 18"/>
           <p:cNvSpPr/>
           <p:nvPr/>
         </p:nvSpPr>
@@ -3504,14 +3084,14 @@
       </p:sp>
       <p:sp>
         <p:nvSpPr>
-          <p:cNvPr id="69" name="CustomShape 19"/>
+          <p:cNvPr id="67" name="CustomShape 19"/>
           <p:cNvSpPr/>
           <p:nvPr/>
         </p:nvSpPr>
         <p:spPr>
           <a:xfrm>
             <a:off x="742320" y="19227600"/>
-            <a:ext cx="9497520" cy="6206040"/>
+            <a:ext cx="9497160" cy="6206040"/>
           </a:xfrm>
           <a:prstGeom prst="rect">
             <a:avLst/>
@@ -3548,7 +3128,7 @@
                 <a:latin typeface="Gill Sans"/>
                 <a:ea typeface="Arial"/>
               </a:rPr>
-              <a:t>The IPEDS database consists of annual survey data collected from post-secondary institutions. Targets are bachelor’s degrees completed within 6 years in 2016-17. Features include institution characteristics, admissions data, and student financial aid data. There were 682 institutions with all considered features. Variance inflation factors above 5 were eliminated, resulting in the feature set below.  </a:t>
+              <a:t>The IPEDS database consists of annual survey data collected from post-secondary institutions. Targets are bachelor’s degrees completed within 6 years in 2016-17. Features include institution characteristics, admissions data, and student financial aid data. There are 682 institutions with all considered features. Variance inflation factors above 5 were eliminated, resulting in the feature set below.  </a:t>
             </a:r>
             <a:endParaRPr b="0" lang="en-US" sz="3600" spc="-1" strike="noStrike">
               <a:latin typeface="Arial"/>
@@ -3558,14 +3138,14 @@
       </p:sp>
       <p:sp>
         <p:nvSpPr>
-          <p:cNvPr id="70" name="CustomShape 20"/>
+          <p:cNvPr id="68" name="CustomShape 20"/>
           <p:cNvSpPr/>
           <p:nvPr/>
         </p:nvSpPr>
         <p:spPr>
           <a:xfrm>
             <a:off x="11155680" y="6503400"/>
-            <a:ext cx="10361160" cy="1268280"/>
+            <a:ext cx="10360800" cy="1268280"/>
           </a:xfrm>
           <a:prstGeom prst="rect">
             <a:avLst/>
@@ -3602,7 +3182,7 @@
                 <a:latin typeface="Gill Sans"/>
                 <a:ea typeface="Arial"/>
               </a:rPr>
-              <a:t>Below are the most important coefficients after Lasso Regularization:</a:t>
+              <a:t>Below are the most important coefficients after Lasso regularization:</a:t>
             </a:r>
             <a:endParaRPr b="0" lang="en-US" sz="3600" spc="-1" strike="noStrike">
               <a:latin typeface="Arial"/>
@@ -3612,14 +3192,14 @@
       </p:sp>
       <p:sp>
         <p:nvSpPr>
-          <p:cNvPr id="71" name="CustomShape 21"/>
+          <p:cNvPr id="69" name="CustomShape 21"/>
           <p:cNvSpPr/>
           <p:nvPr/>
         </p:nvSpPr>
         <p:spPr>
           <a:xfrm>
             <a:off x="11277720" y="16285680"/>
-            <a:ext cx="10209240" cy="777240"/>
+            <a:ext cx="10208880" cy="777240"/>
           </a:xfrm>
           <a:prstGeom prst="rect">
             <a:avLst/>
@@ -3640,7 +3220,7 @@
             <a:spAutoFit/>
           </a:bodyPr>
           <a:p>
-            <a:pPr marL="216000" indent="-214560">
+            <a:pPr marL="216000" indent="-214200">
               <a:lnSpc>
                 <a:spcPct val="100000"/>
               </a:lnSpc>
@@ -3681,14 +3261,14 @@
       </p:sp>
       <p:sp>
         <p:nvSpPr>
-          <p:cNvPr id="72" name="CustomShape 22"/>
+          <p:cNvPr id="70" name="CustomShape 22"/>
           <p:cNvSpPr/>
           <p:nvPr/>
         </p:nvSpPr>
         <p:spPr>
           <a:xfrm>
             <a:off x="11237760" y="17130240"/>
-            <a:ext cx="10157760" cy="2283840"/>
+            <a:ext cx="10157400" cy="2283480"/>
           </a:xfrm>
           <a:prstGeom prst="rect">
             <a:avLst/>
@@ -3725,7 +3305,7 @@
                 <a:latin typeface="Gill Sans"/>
                 <a:ea typeface="Arial"/>
               </a:rPr>
-              <a:t>Five-fold cross validation provided a best RF model with 160 trees. The four most important features affect predicted rates by as much as 20%.</a:t>
+              <a:t>Five-fold cross validation provided a best random forest model with 160 trees. The four most important features affect predicted rates by as much as 20%.</a:t>
             </a:r>
             <a:endParaRPr b="0" lang="en-US" sz="3600" spc="-1" strike="noStrike">
               <a:latin typeface="Arial"/>
@@ -3735,14 +3315,14 @@
       </p:sp>
       <p:sp>
         <p:nvSpPr>
-          <p:cNvPr id="73" name="CustomShape 23"/>
+          <p:cNvPr id="71" name="CustomShape 23"/>
           <p:cNvSpPr/>
           <p:nvPr/>
         </p:nvSpPr>
         <p:spPr>
           <a:xfrm>
             <a:off x="22368600" y="12000960"/>
-            <a:ext cx="10209240" cy="777240"/>
+            <a:ext cx="10208880" cy="777240"/>
           </a:xfrm>
           <a:prstGeom prst="rect">
             <a:avLst/>
@@ -3763,7 +3343,7 @@
             <a:spAutoFit/>
           </a:bodyPr>
           <a:p>
-            <a:pPr marL="216000" indent="-214560">
+            <a:pPr marL="216000" indent="-214200">
               <a:lnSpc>
                 <a:spcPct val="100000"/>
               </a:lnSpc>
@@ -3794,7 +3374,7 @@
                 <a:latin typeface="Gill Sans"/>
                 <a:ea typeface="Arial"/>
               </a:rPr>
-              <a:t>Markov-Chain Monte Carlo</a:t>
+              <a:t>Markov Chain Monte Carlo</a:t>
             </a:r>
             <a:endParaRPr b="0" lang="en-US" sz="4200" spc="-1" strike="noStrike">
               <a:latin typeface="Arial"/>
@@ -3804,14 +3384,14 @@
       </p:sp>
       <p:sp>
         <p:nvSpPr>
-          <p:cNvPr id="74" name="CustomShape 24"/>
+          <p:cNvPr id="72" name="CustomShape 24"/>
           <p:cNvSpPr/>
           <p:nvPr/>
         </p:nvSpPr>
         <p:spPr>
           <a:xfrm>
             <a:off x="33764040" y="28208160"/>
-            <a:ext cx="9684720" cy="4313160"/>
+            <a:ext cx="9684360" cy="4313160"/>
           </a:xfrm>
           <a:prstGeom prst="rect">
             <a:avLst/>
@@ -3845,7 +3425,7 @@
                 <a:latin typeface="Gill Sans"/>
                 <a:ea typeface="Arial"/>
               </a:rPr>
-              <a:t>All three models agree that ACT/SAT acceptance benchmarks are positively correlated with graduation rates for all groups. Percentage of students receiving a Pell Grant is negatively correlated with graduation rate in the Lasso and Random Forest models.  </a:t>
+              <a:t>All three models agree that ACT/SAT acceptance benchmarks are positively correlated with graduation rates for all groups. Percentage of students receiving a Pell Grant is negatively correlated with graduation rate in the Lasso and random forest models.  </a:t>
             </a:r>
             <a:endParaRPr b="0" lang="en-US" sz="3600" spc="-1" strike="noStrike">
               <a:latin typeface="Arial"/>
@@ -3855,14 +3435,14 @@
       </p:sp>
       <p:sp>
         <p:nvSpPr>
-          <p:cNvPr id="75" name="CustomShape 25"/>
+          <p:cNvPr id="73" name="CustomShape 25"/>
           <p:cNvSpPr/>
           <p:nvPr/>
         </p:nvSpPr>
         <p:spPr>
           <a:xfrm>
             <a:off x="33684120" y="4333680"/>
-            <a:ext cx="9990000" cy="1026720"/>
+            <a:ext cx="9989640" cy="1026360"/>
           </a:xfrm>
           <a:prstGeom prst="rect">
             <a:avLst/>
@@ -3911,7 +3491,7 @@
       </p:sp>
       <p:pic>
         <p:nvPicPr>
-          <p:cNvPr id="76" name="" descr=""/>
+          <p:cNvPr id="74" name="" descr=""/>
           <p:cNvPicPr/>
           <p:nvPr/>
         </p:nvPicPr>
@@ -3922,7 +3502,53 @@
         <p:spPr>
           <a:xfrm>
             <a:off x="22128480" y="31377600"/>
-            <a:ext cx="3884760" cy="808200"/>
+            <a:ext cx="3884400" cy="807840"/>
+          </a:xfrm>
+          <a:prstGeom prst="rect">
+            <a:avLst/>
+          </a:prstGeom>
+          <a:ln>
+            <a:noFill/>
+          </a:ln>
+        </p:spPr>
+      </p:pic>
+      <p:pic>
+        <p:nvPicPr>
+          <p:cNvPr id="75" name="" descr=""/>
+          <p:cNvPicPr/>
+          <p:nvPr/>
+        </p:nvPicPr>
+        <p:blipFill>
+          <a:blip r:embed="rId5"/>
+          <a:stretch/>
+        </p:blipFill>
+        <p:spPr>
+          <a:xfrm>
+            <a:off x="22402800" y="28803600"/>
+            <a:ext cx="3179880" cy="1073160"/>
+          </a:xfrm>
+          <a:prstGeom prst="rect">
+            <a:avLst/>
+          </a:prstGeom>
+          <a:ln>
+            <a:noFill/>
+          </a:ln>
+        </p:spPr>
+      </p:pic>
+      <p:pic>
+        <p:nvPicPr>
+          <p:cNvPr id="76" name="" descr=""/>
+          <p:cNvPicPr/>
+          <p:nvPr/>
+        </p:nvPicPr>
+        <p:blipFill>
+          <a:blip r:embed="rId6"/>
+          <a:stretch/>
+        </p:blipFill>
+        <p:spPr>
+          <a:xfrm>
+            <a:off x="22774680" y="30041640"/>
+            <a:ext cx="2644200" cy="1046520"/>
           </a:xfrm>
           <a:prstGeom prst="rect">
             <a:avLst/>
@@ -3939,13 +3565,13 @@
           <p:nvPr/>
         </p:nvPicPr>
         <p:blipFill>
-          <a:blip r:embed="rId5"/>
+          <a:blip r:embed="rId7"/>
           <a:stretch/>
         </p:blipFill>
         <p:spPr>
           <a:xfrm>
-            <a:off x="22402800" y="28803600"/>
-            <a:ext cx="3180240" cy="1073520"/>
+            <a:off x="26517600" y="28803600"/>
+            <a:ext cx="2004840" cy="1078560"/>
           </a:xfrm>
           <a:prstGeom prst="rect">
             <a:avLst/>
@@ -3962,13 +3588,13 @@
           <p:nvPr/>
         </p:nvPicPr>
         <p:blipFill>
-          <a:blip r:embed="rId6"/>
+          <a:blip r:embed="rId8"/>
           <a:stretch/>
         </p:blipFill>
         <p:spPr>
           <a:xfrm>
-            <a:off x="22774680" y="30041640"/>
-            <a:ext cx="2644560" cy="1046880"/>
+            <a:off x="26151840" y="30165840"/>
+            <a:ext cx="3087720" cy="739440"/>
           </a:xfrm>
           <a:prstGeom prst="rect">
             <a:avLst/>
@@ -3985,13 +3611,13 @@
           <p:nvPr/>
         </p:nvPicPr>
         <p:blipFill>
-          <a:blip r:embed="rId7"/>
+          <a:blip r:embed="rId9"/>
           <a:stretch/>
         </p:blipFill>
         <p:spPr>
           <a:xfrm>
-            <a:off x="26517600" y="28803600"/>
-            <a:ext cx="2005200" cy="1078920"/>
+            <a:off x="29626560" y="28924560"/>
+            <a:ext cx="2482200" cy="883440"/>
           </a:xfrm>
           <a:prstGeom prst="rect">
             <a:avLst/>
@@ -4008,13 +3634,13 @@
           <p:nvPr/>
         </p:nvPicPr>
         <p:blipFill>
-          <a:blip r:embed="rId8"/>
+          <a:blip r:embed="rId10"/>
           <a:stretch/>
         </p:blipFill>
         <p:spPr>
           <a:xfrm>
-            <a:off x="26151840" y="30165840"/>
-            <a:ext cx="3088080" cy="739800"/>
+            <a:off x="29432880" y="29986560"/>
+            <a:ext cx="2935440" cy="1140480"/>
           </a:xfrm>
           <a:prstGeom prst="rect">
             <a:avLst/>
@@ -4031,13 +3657,13 @@
           <p:nvPr/>
         </p:nvPicPr>
         <p:blipFill>
-          <a:blip r:embed="rId9"/>
+          <a:blip r:embed="rId11"/>
           <a:stretch/>
         </p:blipFill>
         <p:spPr>
           <a:xfrm>
-            <a:off x="29626560" y="28924560"/>
-            <a:ext cx="2482560" cy="883800"/>
+            <a:off x="26954640" y="31164480"/>
+            <a:ext cx="1847520" cy="1385280"/>
           </a:xfrm>
           <a:prstGeom prst="rect">
             <a:avLst/>
@@ -4050,52 +3676,6 @@
       <p:pic>
         <p:nvPicPr>
           <p:cNvPr id="82" name="" descr=""/>
-          <p:cNvPicPr/>
-          <p:nvPr/>
-        </p:nvPicPr>
-        <p:blipFill>
-          <a:blip r:embed="rId10"/>
-          <a:stretch/>
-        </p:blipFill>
-        <p:spPr>
-          <a:xfrm>
-            <a:off x="29432880" y="29986560"/>
-            <a:ext cx="2935800" cy="1140840"/>
-          </a:xfrm>
-          <a:prstGeom prst="rect">
-            <a:avLst/>
-          </a:prstGeom>
-          <a:ln>
-            <a:noFill/>
-          </a:ln>
-        </p:spPr>
-      </p:pic>
-      <p:pic>
-        <p:nvPicPr>
-          <p:cNvPr id="83" name="" descr=""/>
-          <p:cNvPicPr/>
-          <p:nvPr/>
-        </p:nvPicPr>
-        <p:blipFill>
-          <a:blip r:embed="rId11"/>
-          <a:stretch/>
-        </p:blipFill>
-        <p:spPr>
-          <a:xfrm>
-            <a:off x="26954640" y="31164480"/>
-            <a:ext cx="1847880" cy="1385640"/>
-          </a:xfrm>
-          <a:prstGeom prst="rect">
-            <a:avLst/>
-          </a:prstGeom>
-          <a:ln>
-            <a:noFill/>
-          </a:ln>
-        </p:spPr>
-      </p:pic>
-      <p:pic>
-        <p:nvPicPr>
-          <p:cNvPr id="84" name="" descr=""/>
           <p:cNvPicPr/>
           <p:nvPr/>
         </p:nvPicPr>
@@ -4107,7 +3687,7 @@
         <p:spPr>
           <a:xfrm>
             <a:off x="29556720" y="31272480"/>
-            <a:ext cx="2811960" cy="1187280"/>
+            <a:ext cx="2811600" cy="1186920"/>
           </a:xfrm>
           <a:prstGeom prst="rect">
             <a:avLst/>
@@ -4119,7 +3699,7 @@
       </p:pic>
       <p:pic>
         <p:nvPicPr>
-          <p:cNvPr id="85" name="" descr=""/>
+          <p:cNvPr id="83" name="" descr=""/>
           <p:cNvPicPr/>
           <p:nvPr/>
         </p:nvPicPr>
@@ -4130,7 +3710,7 @@
         <p:spPr>
           <a:xfrm>
             <a:off x="34254000" y="20212920"/>
-            <a:ext cx="8777520" cy="6266880"/>
+            <a:ext cx="8777160" cy="6266520"/>
           </a:xfrm>
           <a:prstGeom prst="rect">
             <a:avLst/>
@@ -4142,28 +3722,28 @@
       </p:pic>
       <p:grpSp>
         <p:nvGrpSpPr>
-          <p:cNvPr id="86" name="Group 26"/>
+          <p:cNvPr id="84" name="Group 26"/>
           <p:cNvGrpSpPr/>
           <p:nvPr/>
         </p:nvGrpSpPr>
         <p:grpSpPr>
           <a:xfrm>
             <a:off x="33284160" y="5669280"/>
-            <a:ext cx="10114560" cy="10717200"/>
+            <a:ext cx="10114200" cy="10716840"/>
             <a:chOff x="33284160" y="5669280"/>
-            <a:chExt cx="10114560" cy="10717200"/>
+            <a:chExt cx="10114200" cy="10716840"/>
           </a:xfrm>
         </p:grpSpPr>
         <p:sp>
           <p:nvSpPr>
-            <p:cNvPr id="87" name="CustomShape 27"/>
+            <p:cNvPr id="85" name="CustomShape 27"/>
             <p:cNvSpPr/>
             <p:nvPr/>
           </p:nvSpPr>
           <p:spPr>
             <a:xfrm>
               <a:off x="35478720" y="5669280"/>
-              <a:ext cx="6948360" cy="597600"/>
+              <a:ext cx="6948000" cy="597600"/>
             </a:xfrm>
             <a:prstGeom prst="rect">
               <a:avLst/>
@@ -4210,7 +3790,7 @@
         </p:sp>
         <p:pic>
           <p:nvPicPr>
-            <p:cNvPr id="88" name="" descr=""/>
+            <p:cNvPr id="86" name="" descr=""/>
             <p:cNvPicPr/>
             <p:nvPr/>
           </p:nvPicPr>
@@ -4222,7 +3802,7 @@
           <p:spPr>
             <a:xfrm>
               <a:off x="33284160" y="6511680"/>
-              <a:ext cx="10114560" cy="9874800"/>
+              <a:ext cx="10114200" cy="9874440"/>
             </a:xfrm>
             <a:prstGeom prst="rect">
               <a:avLst/>
@@ -4235,7 +3815,7 @@
       </p:grpSp>
       <p:pic>
         <p:nvPicPr>
-          <p:cNvPr id="89" name="" descr=""/>
+          <p:cNvPr id="87" name="" descr=""/>
           <p:cNvPicPr/>
           <p:nvPr/>
         </p:nvPicPr>
@@ -4245,8 +3825,8 @@
         </p:blipFill>
         <p:spPr>
           <a:xfrm>
-            <a:off x="862920" y="26060400"/>
-            <a:ext cx="11024280" cy="6217920"/>
+            <a:off x="11887200" y="25957080"/>
+            <a:ext cx="9509760" cy="6369840"/>
           </a:xfrm>
           <a:prstGeom prst="rect">
             <a:avLst/>
@@ -4256,53 +3836,30 @@
           </a:ln>
         </p:spPr>
       </p:pic>
-      <p:pic>
-        <p:nvPicPr>
-          <p:cNvPr id="90" name="" descr=""/>
-          <p:cNvPicPr/>
-          <p:nvPr/>
-        </p:nvPicPr>
-        <p:blipFill>
-          <a:blip r:embed="rId16"/>
-          <a:stretch/>
-        </p:blipFill>
-        <p:spPr>
-          <a:xfrm>
-            <a:off x="11868120" y="25957080"/>
-            <a:ext cx="9437400" cy="6321240"/>
-          </a:xfrm>
-          <a:prstGeom prst="rect">
-            <a:avLst/>
-          </a:prstGeom>
-          <a:ln>
-            <a:noFill/>
-          </a:ln>
-        </p:spPr>
-      </p:pic>
       <p:grpSp>
         <p:nvGrpSpPr>
-          <p:cNvPr id="91" name="Group 28"/>
+          <p:cNvPr id="88" name="Group 28"/>
           <p:cNvGrpSpPr/>
           <p:nvPr/>
         </p:nvGrpSpPr>
         <p:grpSpPr>
           <a:xfrm>
             <a:off x="10344600" y="7950600"/>
-            <a:ext cx="11346840" cy="7680960"/>
+            <a:ext cx="11346480" cy="7680600"/>
             <a:chOff x="10344600" y="7950600"/>
-            <a:chExt cx="11346840" cy="7680960"/>
+            <a:chExt cx="11346480" cy="7680600"/>
           </a:xfrm>
         </p:grpSpPr>
         <p:sp>
           <p:nvSpPr>
-            <p:cNvPr id="92" name="CustomShape 29"/>
+            <p:cNvPr id="89" name="CustomShape 29"/>
             <p:cNvSpPr/>
             <p:nvPr/>
           </p:nvSpPr>
           <p:spPr>
             <a:xfrm>
               <a:off x="13339800" y="7950600"/>
-              <a:ext cx="7039440" cy="597600"/>
+              <a:ext cx="7039080" cy="597600"/>
             </a:xfrm>
             <a:prstGeom prst="rect">
               <a:avLst/>
@@ -4349,19 +3906,19 @@
         </p:sp>
         <p:pic>
           <p:nvPicPr>
-            <p:cNvPr id="93" name="" descr=""/>
+            <p:cNvPr id="90" name="" descr=""/>
             <p:cNvPicPr/>
             <p:nvPr/>
           </p:nvPicPr>
           <p:blipFill>
-            <a:blip r:embed="rId17"/>
+            <a:blip r:embed="rId16"/>
             <a:srcRect l="0" t="0" r="8494" b="0"/>
             <a:stretch/>
           </p:blipFill>
           <p:spPr>
             <a:xfrm>
               <a:off x="10344600" y="8499240"/>
-              <a:ext cx="11346840" cy="7132320"/>
+              <a:ext cx="11346480" cy="7131960"/>
             </a:xfrm>
             <a:prstGeom prst="rect">
               <a:avLst/>
@@ -4374,28 +3931,28 @@
       </p:grpSp>
       <p:grpSp>
         <p:nvGrpSpPr>
-          <p:cNvPr id="94" name="Group 30"/>
+          <p:cNvPr id="91" name="Group 30"/>
           <p:cNvGrpSpPr/>
           <p:nvPr/>
         </p:nvGrpSpPr>
         <p:grpSpPr>
           <a:xfrm>
             <a:off x="21949920" y="16410240"/>
-            <a:ext cx="10511280" cy="10845720"/>
+            <a:ext cx="10510920" cy="10845360"/>
             <a:chOff x="21949920" y="16410240"/>
-            <a:chExt cx="10511280" cy="10845720"/>
+            <a:chExt cx="10510920" cy="10845360"/>
           </a:xfrm>
         </p:grpSpPr>
         <p:sp>
           <p:nvSpPr>
-            <p:cNvPr id="95" name="CustomShape 31"/>
+            <p:cNvPr id="92" name="CustomShape 31"/>
             <p:cNvSpPr/>
             <p:nvPr/>
           </p:nvSpPr>
           <p:spPr>
             <a:xfrm>
               <a:off x="23225760" y="16410240"/>
-              <a:ext cx="8345160" cy="597600"/>
+              <a:ext cx="8344800" cy="597600"/>
             </a:xfrm>
             <a:prstGeom prst="rect">
               <a:avLst/>
@@ -4442,19 +3999,19 @@
         </p:sp>
         <p:pic>
           <p:nvPicPr>
-            <p:cNvPr id="96" name="" descr=""/>
+            <p:cNvPr id="93" name="" descr=""/>
             <p:cNvPicPr/>
             <p:nvPr/>
           </p:nvPicPr>
           <p:blipFill>
-            <a:blip r:embed="rId18"/>
+            <a:blip r:embed="rId17"/>
             <a:srcRect l="0" t="3473" r="0" b="0"/>
             <a:stretch/>
           </p:blipFill>
           <p:spPr>
             <a:xfrm>
               <a:off x="21949920" y="17099280"/>
-              <a:ext cx="10511280" cy="10156680"/>
+              <a:ext cx="10510920" cy="10156320"/>
             </a:xfrm>
             <a:prstGeom prst="rect">
               <a:avLst/>
@@ -4467,28 +4024,121 @@
       </p:grpSp>
       <p:grpSp>
         <p:nvGrpSpPr>
-          <p:cNvPr id="97" name="Group 32"/>
+          <p:cNvPr id="94" name="Group 32"/>
           <p:cNvGrpSpPr/>
           <p:nvPr/>
         </p:nvGrpSpPr>
         <p:grpSpPr>
           <a:xfrm>
             <a:off x="10885680" y="19571040"/>
-            <a:ext cx="10877040" cy="6031800"/>
+            <a:ext cx="10876680" cy="6031440"/>
             <a:chOff x="10885680" y="19571040"/>
-            <a:chExt cx="10877040" cy="6031800"/>
+            <a:chExt cx="10876680" cy="6031440"/>
           </a:xfrm>
         </p:grpSpPr>
         <p:sp>
           <p:nvSpPr>
-            <p:cNvPr id="98" name="CustomShape 33"/>
+            <p:cNvPr id="95" name="CustomShape 33"/>
             <p:cNvSpPr/>
             <p:nvPr/>
           </p:nvSpPr>
           <p:spPr>
             <a:xfrm>
               <a:off x="13529160" y="19571040"/>
-              <a:ext cx="5784840" cy="597600"/>
+              <a:ext cx="5784480" cy="597600"/>
+            </a:xfrm>
+            <a:prstGeom prst="rect">
+              <a:avLst/>
+            </a:prstGeom>
+            <a:noFill/>
+            <a:ln>
+              <a:noFill/>
+            </a:ln>
+          </p:spPr>
+          <p:style>
+            <a:lnRef idx="0"/>
+            <a:fillRef idx="0"/>
+            <a:effectRef idx="0"/>
+            <a:fontRef idx="minor"/>
+          </p:style>
+          <p:txBody>
+            <a:bodyPr lIns="171360" rIns="171360" tIns="85680" bIns="85680">
+              <a:spAutoFit/>
+            </a:bodyPr>
+            <a:p>
+              <a:pPr>
+                <a:lnSpc>
+                  <a:spcPct val="100000"/>
+                </a:lnSpc>
+                <a:spcBef>
+                  <a:spcPts val="2100"/>
+                </a:spcBef>
+              </a:pPr>
+              <a:r>
+                <a:rPr b="1" lang="en-US" sz="2800" spc="-1" strike="noStrike">
+                  <a:solidFill>
+                    <a:srgbClr val="393939"/>
+                  </a:solidFill>
+                  <a:latin typeface="Gill Sans"/>
+                  <a:ea typeface="Arial"/>
+                </a:rPr>
+                <a:t>Partial Dependence Plots</a:t>
+              </a:r>
+              <a:endParaRPr b="0" lang="en-US" sz="2800" spc="-1" strike="noStrike">
+                <a:latin typeface="Arial"/>
+              </a:endParaRPr>
+            </a:p>
+          </p:txBody>
+        </p:sp>
+        <p:pic>
+          <p:nvPicPr>
+            <p:cNvPr id="96" name="" descr=""/>
+            <p:cNvPicPr/>
+            <p:nvPr/>
+          </p:nvPicPr>
+          <p:blipFill>
+            <a:blip r:embed="rId18"/>
+            <a:srcRect l="0" t="0" r="0" b="50224"/>
+            <a:stretch/>
+          </p:blipFill>
+          <p:spPr>
+            <a:xfrm>
+              <a:off x="10885680" y="20194560"/>
+              <a:ext cx="10876680" cy="5407920"/>
+            </a:xfrm>
+            <a:prstGeom prst="rect">
+              <a:avLst/>
+            </a:prstGeom>
+            <a:ln>
+              <a:noFill/>
+            </a:ln>
+          </p:spPr>
+        </p:pic>
+      </p:grpSp>
+      <p:grpSp>
+        <p:nvGrpSpPr>
+          <p:cNvPr id="97" name="Group 34"/>
+          <p:cNvGrpSpPr/>
+          <p:nvPr/>
+        </p:nvGrpSpPr>
+        <p:grpSpPr>
+          <a:xfrm>
+            <a:off x="22110480" y="5652720"/>
+            <a:ext cx="10876680" cy="6087960"/>
+            <a:chOff x="22110480" y="5652720"/>
+            <a:chExt cx="10876680" cy="6087960"/>
+          </a:xfrm>
+        </p:grpSpPr>
+        <p:sp>
+          <p:nvSpPr>
+            <p:cNvPr id="98" name="CustomShape 35"/>
+            <p:cNvSpPr/>
+            <p:nvPr/>
+          </p:nvSpPr>
+          <p:spPr>
+            <a:xfrm>
+              <a:off x="24916320" y="5652720"/>
+              <a:ext cx="5684400" cy="597600"/>
             </a:xfrm>
             <a:prstGeom prst="rect">
               <a:avLst/>
@@ -4541,13 +4191,13 @@
           </p:nvPicPr>
           <p:blipFill>
             <a:blip r:embed="rId19"/>
-            <a:srcRect l="0" t="0" r="0" b="50230"/>
+            <a:srcRect l="0" t="49498" r="0" b="0"/>
             <a:stretch/>
           </p:blipFill>
           <p:spPr>
             <a:xfrm>
-              <a:off x="10885680" y="20194560"/>
-              <a:ext cx="10877040" cy="5408280"/>
+              <a:off x="22110480" y="6253920"/>
+              <a:ext cx="10876680" cy="5486760"/>
             </a:xfrm>
             <a:prstGeom prst="rect">
               <a:avLst/>
@@ -4558,99 +4208,29 @@
           </p:spPr>
         </p:pic>
       </p:grpSp>
-      <p:grpSp>
-        <p:nvGrpSpPr>
-          <p:cNvPr id="100" name="Group 34"/>
-          <p:cNvGrpSpPr/>
-          <p:nvPr/>
-        </p:nvGrpSpPr>
-        <p:grpSpPr>
-          <a:xfrm>
-            <a:off x="22110480" y="5652720"/>
-            <a:ext cx="10877040" cy="6088320"/>
-            <a:chOff x="22110480" y="5652720"/>
-            <a:chExt cx="10877040" cy="6088320"/>
-          </a:xfrm>
-        </p:grpSpPr>
-        <p:sp>
-          <p:nvSpPr>
-            <p:cNvPr id="101" name="CustomShape 35"/>
-            <p:cNvSpPr/>
-            <p:nvPr/>
-          </p:nvSpPr>
-          <p:spPr>
-            <a:xfrm>
-              <a:off x="24916320" y="5652720"/>
-              <a:ext cx="5684760" cy="597600"/>
-            </a:xfrm>
-            <a:prstGeom prst="rect">
-              <a:avLst/>
-            </a:prstGeom>
+      <p:pic>
+        <p:nvPicPr>
+          <p:cNvPr id="100" name="" descr=""/>
+          <p:cNvPicPr/>
+          <p:nvPr/>
+        </p:nvPicPr>
+        <p:blipFill>
+          <a:blip r:embed="rId20"/>
+          <a:stretch/>
+        </p:blipFill>
+        <p:spPr>
+          <a:xfrm>
+            <a:off x="965160" y="25985160"/>
+            <a:ext cx="11013480" cy="6359400"/>
+          </a:xfrm>
+          <a:prstGeom prst="rect">
+            <a:avLst/>
+          </a:prstGeom>
+          <a:ln>
             <a:noFill/>
-            <a:ln>
-              <a:noFill/>
-            </a:ln>
-          </p:spPr>
-          <p:style>
-            <a:lnRef idx="0"/>
-            <a:fillRef idx="0"/>
-            <a:effectRef idx="0"/>
-            <a:fontRef idx="minor"/>
-          </p:style>
-          <p:txBody>
-            <a:bodyPr lIns="171360" rIns="171360" tIns="85680" bIns="85680">
-              <a:spAutoFit/>
-            </a:bodyPr>
-            <a:p>
-              <a:pPr>
-                <a:lnSpc>
-                  <a:spcPct val="100000"/>
-                </a:lnSpc>
-                <a:spcBef>
-                  <a:spcPts val="2100"/>
-                </a:spcBef>
-              </a:pPr>
-              <a:r>
-                <a:rPr b="1" lang="en-US" sz="2800" spc="-1" strike="noStrike">
-                  <a:solidFill>
-                    <a:srgbClr val="393939"/>
-                  </a:solidFill>
-                  <a:latin typeface="Gill Sans"/>
-                  <a:ea typeface="Arial"/>
-                </a:rPr>
-                <a:t>Partial Dependence Plots</a:t>
-              </a:r>
-              <a:endParaRPr b="0" lang="en-US" sz="2800" spc="-1" strike="noStrike">
-                <a:latin typeface="Arial"/>
-              </a:endParaRPr>
-            </a:p>
-          </p:txBody>
-        </p:sp>
-        <p:pic>
-          <p:nvPicPr>
-            <p:cNvPr id="102" name="" descr=""/>
-            <p:cNvPicPr/>
-            <p:nvPr/>
-          </p:nvPicPr>
-          <p:blipFill>
-            <a:blip r:embed="rId20"/>
-            <a:srcRect l="0" t="49505" r="0" b="0"/>
-            <a:stretch/>
-          </p:blipFill>
-          <p:spPr>
-            <a:xfrm>
-              <a:off x="22110480" y="6253920"/>
-              <a:ext cx="10877040" cy="5487120"/>
-            </a:xfrm>
-            <a:prstGeom prst="rect">
-              <a:avLst/>
-            </a:prstGeom>
-            <a:ln>
-              <a:noFill/>
-            </a:ln>
-          </p:spPr>
-        </p:pic>
-      </p:grpSp>
+          </a:ln>
+        </p:spPr>
+      </p:pic>
     </p:spTree>
   </p:cSld>
   <mc:AlternateContent>

</xml_diff>

<commit_message>
last minute change to poster
</commit_message>
<xml_diff>
--- a/presentation/Fred_Berendse_poster.pptx
+++ b/presentation/Fred_Berendse_poster.pptx
@@ -34,7 +34,7 @@
       </p:grpSpPr>
       <p:sp>
         <p:nvSpPr>
-          <p:cNvPr id="40" name="PlaceHolder 1"/>
+          <p:cNvPr id="42" name="PlaceHolder 1"/>
           <p:cNvSpPr>
             <a:spLocks noGrp="1"/>
           </p:cNvSpPr>
@@ -61,7 +61,43 @@
               <a:rPr b="0" lang="en-US" sz="4400" spc="-1" strike="noStrike">
                 <a:latin typeface="Arial"/>
               </a:rPr>
-              <a:t>Click to move the slide</a:t>
+              <a:t>Clic</a:t>
+            </a:r>
+            <a:r>
+              <a:rPr b="0" lang="en-US" sz="4400" spc="-1" strike="noStrike">
+                <a:latin typeface="Arial"/>
+              </a:rPr>
+              <a:t>k to </a:t>
+            </a:r>
+            <a:r>
+              <a:rPr b="0" lang="en-US" sz="4400" spc="-1" strike="noStrike">
+                <a:latin typeface="Arial"/>
+              </a:rPr>
+              <a:t>mov</a:t>
+            </a:r>
+            <a:r>
+              <a:rPr b="0" lang="en-US" sz="4400" spc="-1" strike="noStrike">
+                <a:latin typeface="Arial"/>
+              </a:rPr>
+              <a:t>e </a:t>
+            </a:r>
+            <a:r>
+              <a:rPr b="0" lang="en-US" sz="4400" spc="-1" strike="noStrike">
+                <a:latin typeface="Arial"/>
+              </a:rPr>
+              <a:t>the </a:t>
+            </a:r>
+            <a:r>
+              <a:rPr b="0" lang="en-US" sz="4400" spc="-1" strike="noStrike">
+                <a:latin typeface="Arial"/>
+              </a:rPr>
+              <a:t>slid</a:t>
+            </a:r>
+            <a:r>
+              <a:rPr b="0" lang="en-US" sz="4400" spc="-1" strike="noStrike">
+                <a:latin typeface="Arial"/>
+              </a:rPr>
+              <a:t>e</a:t>
             </a:r>
             <a:endParaRPr b="0" lang="en-US" sz="4400" spc="-1" strike="noStrike">
               <a:latin typeface="Arial"/>
@@ -71,7 +107,7 @@
       </p:sp>
       <p:sp>
         <p:nvSpPr>
-          <p:cNvPr id="41" name="PlaceHolder 2"/>
+          <p:cNvPr id="43" name="PlaceHolder 2"/>
           <p:cNvSpPr>
             <a:spLocks noGrp="1"/>
           </p:cNvSpPr>
@@ -107,7 +143,7 @@
       </p:sp>
       <p:sp>
         <p:nvSpPr>
-          <p:cNvPr id="42" name="PlaceHolder 3"/>
+          <p:cNvPr id="44" name="PlaceHolder 3"/>
           <p:cNvSpPr>
             <a:spLocks noGrp="1"/>
           </p:cNvSpPr>
@@ -133,7 +169,7 @@
               <a:rPr b="0" lang="en-US" sz="1400" spc="-1" strike="noStrike">
                 <a:latin typeface="Times New Roman"/>
               </a:rPr>
-              <a:t>&lt;header&gt;</a:t>
+              <a:t> </a:t>
             </a:r>
             <a:endParaRPr b="0" lang="en-US" sz="1400" spc="-1" strike="noStrike">
               <a:latin typeface="Times New Roman"/>
@@ -143,7 +179,7 @@
       </p:sp>
       <p:sp>
         <p:nvSpPr>
-          <p:cNvPr id="43" name="PlaceHolder 4"/>
+          <p:cNvPr id="45" name="PlaceHolder 4"/>
           <p:cNvSpPr>
             <a:spLocks noGrp="1"/>
           </p:cNvSpPr>
@@ -170,7 +206,7 @@
               <a:rPr b="0" lang="en-US" sz="1400" spc="-1" strike="noStrike">
                 <a:latin typeface="Times New Roman"/>
               </a:rPr>
-              <a:t>&lt;date/time&gt;</a:t>
+              <a:t> </a:t>
             </a:r>
             <a:endParaRPr b="0" lang="en-US" sz="1400" spc="-1" strike="noStrike">
               <a:latin typeface="Times New Roman"/>
@@ -180,7 +216,7 @@
       </p:sp>
       <p:sp>
         <p:nvSpPr>
-          <p:cNvPr id="44" name="PlaceHolder 5"/>
+          <p:cNvPr id="46" name="PlaceHolder 5"/>
           <p:cNvSpPr>
             <a:spLocks noGrp="1"/>
           </p:cNvSpPr>
@@ -206,7 +242,7 @@
               <a:rPr b="0" lang="en-US" sz="1400" spc="-1" strike="noStrike">
                 <a:latin typeface="Times New Roman"/>
               </a:rPr>
-              <a:t>&lt;footer&gt;</a:t>
+              <a:t> </a:t>
             </a:r>
             <a:endParaRPr b="0" lang="en-US" sz="1400" spc="-1" strike="noStrike">
               <a:latin typeface="Times New Roman"/>
@@ -216,7 +252,7 @@
       </p:sp>
       <p:sp>
         <p:nvSpPr>
-          <p:cNvPr id="45" name="PlaceHolder 6"/>
+          <p:cNvPr id="47" name="PlaceHolder 6"/>
           <p:cNvSpPr>
             <a:spLocks noGrp="1"/>
           </p:cNvSpPr>
@@ -239,11 +275,11 @@
           </a:bodyPr>
           <a:p>
             <a:pPr algn="r"/>
-            <a:fld id="{1F41C718-669A-4002-A2AF-905704C956F4}" type="slidenum">
+            <a:fld id="{49A38029-952C-40D2-870E-4064737FB55C}" type="slidenum">
               <a:rPr b="0" lang="en-US" sz="1400" spc="-1" strike="noStrike">
                 <a:latin typeface="Times New Roman"/>
               </a:rPr>
-              <a:t>&lt;number&gt;</a:t>
+              <a:t>1</a:t>
             </a:fld>
             <a:endParaRPr b="0" lang="en-US" sz="1400" spc="-1" strike="noStrike">
               <a:latin typeface="Times New Roman"/>
@@ -276,14 +312,14 @@
       </p:grpSpPr>
       <p:sp>
         <p:nvSpPr>
-          <p:cNvPr id="101" name="CustomShape 1"/>
+          <p:cNvPr id="102" name="CustomShape 1"/>
           <p:cNvSpPr/>
           <p:nvPr/>
         </p:nvSpPr>
         <p:spPr>
           <a:xfrm>
             <a:off x="3884760" y="8685360"/>
-            <a:ext cx="2969280" cy="454680"/>
+            <a:ext cx="2968920" cy="454320"/>
           </a:xfrm>
           <a:prstGeom prst="rect">
             <a:avLst/>
@@ -309,7 +345,7 @@
                 <a:spcPct val="100000"/>
               </a:lnSpc>
             </a:pPr>
-            <a:fld id="{ECE32AAB-8C79-40D2-9B0C-C7AABF8452F3}" type="slidenum">
+            <a:fld id="{FEA58A31-E0DF-4E01-8A5D-E659F8D4B98F}" type="slidenum">
               <a:rPr b="0" lang="en-US" sz="1200" spc="-1" strike="noStrike">
                 <a:solidFill>
                   <a:srgbClr val="000000"/>
@@ -326,7 +362,7 @@
       </p:sp>
       <p:sp>
         <p:nvSpPr>
-          <p:cNvPr id="102" name="PlaceHolder 2"/>
+          <p:cNvPr id="103" name="PlaceHolder 2"/>
           <p:cNvSpPr>
             <a:spLocks noGrp="1"/>
           </p:cNvSpPr>
@@ -337,16 +373,16 @@
         <p:spPr>
           <a:xfrm>
             <a:off x="1143000" y="685800"/>
-            <a:ext cx="4569480" cy="3426480"/>
-          </a:xfrm>
-          <a:prstGeom prst="rect">
-            <a:avLst/>
-          </a:prstGeom>
-        </p:spPr>
-      </p:sp>
-      <p:sp>
-        <p:nvSpPr>
-          <p:cNvPr id="103" name="PlaceHolder 3"/>
+            <a:ext cx="4569120" cy="3426120"/>
+          </a:xfrm>
+          <a:prstGeom prst="rect">
+            <a:avLst/>
+          </a:prstGeom>
+        </p:spPr>
+      </p:sp>
+      <p:sp>
+        <p:nvSpPr>
+          <p:cNvPr id="104" name="PlaceHolder 3"/>
           <p:cNvSpPr>
             <a:spLocks noGrp="1"/>
           </p:cNvSpPr>
@@ -357,7 +393,7 @@
         <p:spPr>
           <a:xfrm>
             <a:off x="685800" y="4343400"/>
-            <a:ext cx="5483880" cy="4112280"/>
+            <a:ext cx="5483520" cy="4111920"/>
           </a:xfrm>
           <a:prstGeom prst="rect">
             <a:avLst/>
@@ -420,7 +456,7 @@
       </p:grpSpPr>
       <p:sp>
         <p:nvSpPr>
-          <p:cNvPr id="25" name="PlaceHolder 1"/>
+          <p:cNvPr id="27" name="PlaceHolder 1"/>
           <p:cNvSpPr>
             <a:spLocks noGrp="1"/>
           </p:cNvSpPr>
@@ -451,7 +487,7 @@
       </p:sp>
       <p:sp>
         <p:nvSpPr>
-          <p:cNvPr id="26" name="PlaceHolder 2"/>
+          <p:cNvPr id="28" name="PlaceHolder 2"/>
           <p:cNvSpPr>
             <a:spLocks noGrp="1"/>
           </p:cNvSpPr>
@@ -481,7 +517,7 @@
       </p:sp>
       <p:sp>
         <p:nvSpPr>
-          <p:cNvPr id="27" name="PlaceHolder 3"/>
+          <p:cNvPr id="29" name="PlaceHolder 3"/>
           <p:cNvSpPr>
             <a:spLocks noGrp="1"/>
           </p:cNvSpPr>
@@ -533,7 +569,7 @@
       </p:grpSpPr>
       <p:sp>
         <p:nvSpPr>
-          <p:cNvPr id="28" name="PlaceHolder 1"/>
+          <p:cNvPr id="30" name="PlaceHolder 1"/>
           <p:cNvSpPr>
             <a:spLocks noGrp="1"/>
           </p:cNvSpPr>
@@ -564,7 +600,7 @@
       </p:sp>
       <p:sp>
         <p:nvSpPr>
-          <p:cNvPr id="29" name="PlaceHolder 2"/>
+          <p:cNvPr id="31" name="PlaceHolder 2"/>
           <p:cNvSpPr>
             <a:spLocks noGrp="1"/>
           </p:cNvSpPr>
@@ -594,7 +630,7 @@
       </p:sp>
       <p:sp>
         <p:nvSpPr>
-          <p:cNvPr id="30" name="PlaceHolder 3"/>
+          <p:cNvPr id="32" name="PlaceHolder 3"/>
           <p:cNvSpPr>
             <a:spLocks noGrp="1"/>
           </p:cNvSpPr>
@@ -624,7 +660,7 @@
       </p:sp>
       <p:sp>
         <p:nvSpPr>
-          <p:cNvPr id="31" name="PlaceHolder 4"/>
+          <p:cNvPr id="33" name="PlaceHolder 4"/>
           <p:cNvSpPr>
             <a:spLocks noGrp="1"/>
           </p:cNvSpPr>
@@ -654,7 +690,7 @@
       </p:sp>
       <p:sp>
         <p:nvSpPr>
-          <p:cNvPr id="32" name="PlaceHolder 5"/>
+          <p:cNvPr id="34" name="PlaceHolder 5"/>
           <p:cNvSpPr>
             <a:spLocks noGrp="1"/>
           </p:cNvSpPr>
@@ -706,7 +742,7 @@
       </p:grpSpPr>
       <p:sp>
         <p:nvSpPr>
-          <p:cNvPr id="33" name="PlaceHolder 1"/>
+          <p:cNvPr id="35" name="PlaceHolder 1"/>
           <p:cNvSpPr>
             <a:spLocks noGrp="1"/>
           </p:cNvSpPr>
@@ -737,7 +773,7 @@
       </p:sp>
       <p:sp>
         <p:nvSpPr>
-          <p:cNvPr id="34" name="PlaceHolder 2"/>
+          <p:cNvPr id="36" name="PlaceHolder 2"/>
           <p:cNvSpPr>
             <a:spLocks noGrp="1"/>
           </p:cNvSpPr>
@@ -767,7 +803,7 @@
       </p:sp>
       <p:sp>
         <p:nvSpPr>
-          <p:cNvPr id="35" name="PlaceHolder 3"/>
+          <p:cNvPr id="37" name="PlaceHolder 3"/>
           <p:cNvSpPr>
             <a:spLocks noGrp="1"/>
           </p:cNvSpPr>
@@ -797,7 +833,7 @@
       </p:sp>
       <p:sp>
         <p:nvSpPr>
-          <p:cNvPr id="36" name="PlaceHolder 4"/>
+          <p:cNvPr id="38" name="PlaceHolder 4"/>
           <p:cNvSpPr>
             <a:spLocks noGrp="1"/>
           </p:cNvSpPr>
@@ -827,7 +863,7 @@
       </p:sp>
       <p:sp>
         <p:nvSpPr>
-          <p:cNvPr id="37" name="PlaceHolder 5"/>
+          <p:cNvPr id="39" name="PlaceHolder 5"/>
           <p:cNvSpPr>
             <a:spLocks noGrp="1"/>
           </p:cNvSpPr>
@@ -857,7 +893,7 @@
       </p:sp>
       <p:sp>
         <p:nvSpPr>
-          <p:cNvPr id="38" name="PlaceHolder 6"/>
+          <p:cNvPr id="40" name="PlaceHolder 6"/>
           <p:cNvSpPr>
             <a:spLocks noGrp="1"/>
           </p:cNvSpPr>
@@ -887,7 +923,7 @@
       </p:sp>
       <p:sp>
         <p:nvSpPr>
-          <p:cNvPr id="39" name="PlaceHolder 7"/>
+          <p:cNvPr id="41" name="PlaceHolder 7"/>
           <p:cNvSpPr>
             <a:spLocks noGrp="1"/>
           </p:cNvSpPr>
@@ -939,7 +975,7 @@
       </p:grpSpPr>
       <p:sp>
         <p:nvSpPr>
-          <p:cNvPr id="4" name="PlaceHolder 1"/>
+          <p:cNvPr id="6" name="PlaceHolder 1"/>
           <p:cNvSpPr>
             <a:spLocks noGrp="1"/>
           </p:cNvSpPr>
@@ -970,7 +1006,7 @@
       </p:sp>
       <p:sp>
         <p:nvSpPr>
-          <p:cNvPr id="5" name="PlaceHolder 2"/>
+          <p:cNvPr id="7" name="PlaceHolder 2"/>
           <p:cNvSpPr>
             <a:spLocks noGrp="1"/>
           </p:cNvSpPr>
@@ -1023,7 +1059,7 @@
       </p:grpSpPr>
       <p:sp>
         <p:nvSpPr>
-          <p:cNvPr id="6" name="PlaceHolder 1"/>
+          <p:cNvPr id="8" name="PlaceHolder 1"/>
           <p:cNvSpPr>
             <a:spLocks noGrp="1"/>
           </p:cNvSpPr>
@@ -1054,7 +1090,7 @@
       </p:sp>
       <p:sp>
         <p:nvSpPr>
-          <p:cNvPr id="7" name="PlaceHolder 2"/>
+          <p:cNvPr id="9" name="PlaceHolder 2"/>
           <p:cNvSpPr>
             <a:spLocks noGrp="1"/>
           </p:cNvSpPr>
@@ -1106,7 +1142,7 @@
       </p:grpSpPr>
       <p:sp>
         <p:nvSpPr>
-          <p:cNvPr id="8" name="PlaceHolder 1"/>
+          <p:cNvPr id="10" name="PlaceHolder 1"/>
           <p:cNvSpPr>
             <a:spLocks noGrp="1"/>
           </p:cNvSpPr>
@@ -1137,7 +1173,7 @@
       </p:sp>
       <p:sp>
         <p:nvSpPr>
-          <p:cNvPr id="9" name="PlaceHolder 2"/>
+          <p:cNvPr id="11" name="PlaceHolder 2"/>
           <p:cNvSpPr>
             <a:spLocks noGrp="1"/>
           </p:cNvSpPr>
@@ -1167,7 +1203,7 @@
       </p:sp>
       <p:sp>
         <p:nvSpPr>
-          <p:cNvPr id="10" name="PlaceHolder 3"/>
+          <p:cNvPr id="12" name="PlaceHolder 3"/>
           <p:cNvSpPr>
             <a:spLocks noGrp="1"/>
           </p:cNvSpPr>
@@ -1219,7 +1255,7 @@
       </p:grpSpPr>
       <p:sp>
         <p:nvSpPr>
-          <p:cNvPr id="11" name="PlaceHolder 1"/>
+          <p:cNvPr id="13" name="PlaceHolder 1"/>
           <p:cNvSpPr>
             <a:spLocks noGrp="1"/>
           </p:cNvSpPr>
@@ -1272,7 +1308,7 @@
       </p:grpSpPr>
       <p:sp>
         <p:nvSpPr>
-          <p:cNvPr id="12" name="PlaceHolder 1"/>
+          <p:cNvPr id="14" name="PlaceHolder 1"/>
           <p:cNvSpPr>
             <a:spLocks noGrp="1"/>
           </p:cNvSpPr>
@@ -1325,7 +1361,7 @@
       </p:grpSpPr>
       <p:sp>
         <p:nvSpPr>
-          <p:cNvPr id="13" name="PlaceHolder 1"/>
+          <p:cNvPr id="15" name="PlaceHolder 1"/>
           <p:cNvSpPr>
             <a:spLocks noGrp="1"/>
           </p:cNvSpPr>
@@ -1356,7 +1392,7 @@
       </p:sp>
       <p:sp>
         <p:nvSpPr>
-          <p:cNvPr id="14" name="PlaceHolder 2"/>
+          <p:cNvPr id="16" name="PlaceHolder 2"/>
           <p:cNvSpPr>
             <a:spLocks noGrp="1"/>
           </p:cNvSpPr>
@@ -1386,7 +1422,7 @@
       </p:sp>
       <p:sp>
         <p:nvSpPr>
-          <p:cNvPr id="15" name="PlaceHolder 3"/>
+          <p:cNvPr id="17" name="PlaceHolder 3"/>
           <p:cNvSpPr>
             <a:spLocks noGrp="1"/>
           </p:cNvSpPr>
@@ -1416,7 +1452,7 @@
       </p:sp>
       <p:sp>
         <p:nvSpPr>
-          <p:cNvPr id="16" name="PlaceHolder 4"/>
+          <p:cNvPr id="18" name="PlaceHolder 4"/>
           <p:cNvSpPr>
             <a:spLocks noGrp="1"/>
           </p:cNvSpPr>
@@ -1468,7 +1504,7 @@
       </p:grpSpPr>
       <p:sp>
         <p:nvSpPr>
-          <p:cNvPr id="17" name="PlaceHolder 1"/>
+          <p:cNvPr id="19" name="PlaceHolder 1"/>
           <p:cNvSpPr>
             <a:spLocks noGrp="1"/>
           </p:cNvSpPr>
@@ -1499,7 +1535,7 @@
       </p:sp>
       <p:sp>
         <p:nvSpPr>
-          <p:cNvPr id="18" name="PlaceHolder 2"/>
+          <p:cNvPr id="20" name="PlaceHolder 2"/>
           <p:cNvSpPr>
             <a:spLocks noGrp="1"/>
           </p:cNvSpPr>
@@ -1529,7 +1565,7 @@
       </p:sp>
       <p:sp>
         <p:nvSpPr>
-          <p:cNvPr id="19" name="PlaceHolder 3"/>
+          <p:cNvPr id="21" name="PlaceHolder 3"/>
           <p:cNvSpPr>
             <a:spLocks noGrp="1"/>
           </p:cNvSpPr>
@@ -1559,7 +1595,7 @@
       </p:sp>
       <p:sp>
         <p:nvSpPr>
-          <p:cNvPr id="20" name="PlaceHolder 4"/>
+          <p:cNvPr id="22" name="PlaceHolder 4"/>
           <p:cNvSpPr>
             <a:spLocks noGrp="1"/>
           </p:cNvSpPr>
@@ -1611,7 +1647,7 @@
       </p:grpSpPr>
       <p:sp>
         <p:nvSpPr>
-          <p:cNvPr id="21" name="PlaceHolder 1"/>
+          <p:cNvPr id="23" name="PlaceHolder 1"/>
           <p:cNvSpPr>
             <a:spLocks noGrp="1"/>
           </p:cNvSpPr>
@@ -1642,7 +1678,7 @@
       </p:sp>
       <p:sp>
         <p:nvSpPr>
-          <p:cNvPr id="22" name="PlaceHolder 2"/>
+          <p:cNvPr id="24" name="PlaceHolder 2"/>
           <p:cNvSpPr>
             <a:spLocks noGrp="1"/>
           </p:cNvSpPr>
@@ -1672,7 +1708,7 @@
       </p:sp>
       <p:sp>
         <p:nvSpPr>
-          <p:cNvPr id="23" name="PlaceHolder 3"/>
+          <p:cNvPr id="25" name="PlaceHolder 3"/>
           <p:cNvSpPr>
             <a:spLocks noGrp="1"/>
           </p:cNvSpPr>
@@ -1702,7 +1738,7 @@
       </p:sp>
       <p:sp>
         <p:nvSpPr>
-          <p:cNvPr id="24" name="PlaceHolder 4"/>
+          <p:cNvPr id="26" name="PlaceHolder 4"/>
           <p:cNvSpPr>
             <a:spLocks noGrp="1"/>
           </p:cNvSpPr>
@@ -1771,8 +1807,8 @@
         </p:blipFill>
         <p:spPr>
           <a:xfrm rot="16200000">
-            <a:off x="-9245520" y="16461720"/>
-            <a:ext cx="15364440" cy="1559520"/>
+            <a:off x="-9245520" y="16462080"/>
+            <a:ext cx="15364080" cy="1559160"/>
           </a:xfrm>
           <a:prstGeom prst="rect">
             <a:avLst/>
@@ -1794,8 +1830,8 @@
         </p:blipFill>
         <p:spPr>
           <a:xfrm rot="5400000">
-            <a:off x="37772280" y="16459200"/>
-            <a:ext cx="15364440" cy="1559520"/>
+            <a:off x="37772640" y="16459200"/>
+            <a:ext cx="15364080" cy="1559160"/>
           </a:xfrm>
           <a:prstGeom prst="rect">
             <a:avLst/>
@@ -1818,7 +1854,7 @@
         <p:spPr>
           <a:xfrm>
             <a:off x="57240" y="33426360"/>
-            <a:ext cx="43774560" cy="2016720"/>
+            <a:ext cx="43774200" cy="2016360"/>
           </a:xfrm>
           <a:prstGeom prst="rect">
             <a:avLst/>
@@ -1837,7 +1873,7 @@
         <p:spPr>
           <a:xfrm>
             <a:off x="57240" y="33998040"/>
-            <a:ext cx="21943080" cy="1267560"/>
+            <a:ext cx="21942720" cy="1267200"/>
           </a:xfrm>
           <a:prstGeom prst="rect">
             <a:avLst/>
@@ -1882,6 +1918,222 @@
               <a:t>Template ID: greenapple  Size: 36x48</a:t>
             </a:r>
             <a:endParaRPr b="0" lang="en-US" sz="6360" spc="-1" strike="noStrike">
+              <a:latin typeface="Arial"/>
+            </a:endParaRPr>
+          </a:p>
+        </p:txBody>
+      </p:sp>
+      <p:sp>
+        <p:nvSpPr>
+          <p:cNvPr id="4" name="PlaceHolder 2"/>
+          <p:cNvSpPr>
+            <a:spLocks noGrp="1"/>
+          </p:cNvSpPr>
+          <p:nvPr>
+            <p:ph type="title"/>
+          </p:nvPr>
+        </p:nvSpPr>
+        <p:spPr>
+          <a:xfrm>
+            <a:off x="2194560" y="1313280"/>
+            <a:ext cx="39501720" cy="5496840"/>
+          </a:xfrm>
+          <a:prstGeom prst="rect">
+            <a:avLst/>
+          </a:prstGeom>
+        </p:spPr>
+        <p:txBody>
+          <a:bodyPr lIns="0" rIns="0" tIns="0" bIns="0" anchor="ctr">
+            <a:noAutofit/>
+          </a:bodyPr>
+          <a:p>
+            <a:pPr algn="ctr"/>
+            <a:r>
+              <a:rPr b="0" lang="en-US" sz="4400" spc="-1" strike="noStrike">
+                <a:latin typeface="Arial"/>
+              </a:rPr>
+              <a:t>Click to edit the title text format</a:t>
+            </a:r>
+            <a:endParaRPr b="0" lang="en-US" sz="4400" spc="-1" strike="noStrike">
+              <a:latin typeface="Arial"/>
+            </a:endParaRPr>
+          </a:p>
+        </p:txBody>
+      </p:sp>
+      <p:sp>
+        <p:nvSpPr>
+          <p:cNvPr id="5" name="PlaceHolder 3"/>
+          <p:cNvSpPr>
+            <a:spLocks noGrp="1"/>
+          </p:cNvSpPr>
+          <p:nvPr>
+            <p:ph type="body"/>
+          </p:nvPr>
+        </p:nvSpPr>
+        <p:spPr>
+          <a:xfrm>
+            <a:off x="2194560" y="7702560"/>
+            <a:ext cx="39501720" cy="19092240"/>
+          </a:xfrm>
+          <a:prstGeom prst="rect">
+            <a:avLst/>
+          </a:prstGeom>
+        </p:spPr>
+        <p:txBody>
+          <a:bodyPr lIns="0" rIns="0" tIns="0" bIns="0">
+            <a:normAutofit/>
+          </a:bodyPr>
+          <a:p>
+            <a:pPr marL="432000" indent="-324000">
+              <a:spcBef>
+                <a:spcPts val="1417"/>
+              </a:spcBef>
+              <a:buClr>
+                <a:srgbClr val="000000"/>
+              </a:buClr>
+              <a:buSzPct val="45000"/>
+              <a:buFont typeface="Wingdings" charset="2"/>
+              <a:buChar char=""/>
+            </a:pPr>
+            <a:r>
+              <a:rPr b="0" lang="en-US" sz="3200" spc="-1" strike="noStrike">
+                <a:latin typeface="Arial"/>
+              </a:rPr>
+              <a:t>Click to edit the outline text format</a:t>
+            </a:r>
+            <a:endParaRPr b="0" lang="en-US" sz="3200" spc="-1" strike="noStrike">
+              <a:latin typeface="Arial"/>
+            </a:endParaRPr>
+          </a:p>
+          <a:p>
+            <a:pPr lvl="1" marL="864000" indent="-324000">
+              <a:spcBef>
+                <a:spcPts val="1134"/>
+              </a:spcBef>
+              <a:buClr>
+                <a:srgbClr val="000000"/>
+              </a:buClr>
+              <a:buSzPct val="75000"/>
+              <a:buFont typeface="Symbol" charset="2"/>
+              <a:buChar char=""/>
+            </a:pPr>
+            <a:r>
+              <a:rPr b="0" lang="en-US" sz="2800" spc="-1" strike="noStrike">
+                <a:latin typeface="Arial"/>
+              </a:rPr>
+              <a:t>Second Outline Level</a:t>
+            </a:r>
+            <a:endParaRPr b="0" lang="en-US" sz="2800" spc="-1" strike="noStrike">
+              <a:latin typeface="Arial"/>
+            </a:endParaRPr>
+          </a:p>
+          <a:p>
+            <a:pPr lvl="2" marL="1296000" indent="-288000">
+              <a:spcBef>
+                <a:spcPts val="850"/>
+              </a:spcBef>
+              <a:buClr>
+                <a:srgbClr val="000000"/>
+              </a:buClr>
+              <a:buSzPct val="45000"/>
+              <a:buFont typeface="Wingdings" charset="2"/>
+              <a:buChar char=""/>
+            </a:pPr>
+            <a:r>
+              <a:rPr b="0" lang="en-US" sz="2400" spc="-1" strike="noStrike">
+                <a:latin typeface="Arial"/>
+              </a:rPr>
+              <a:t>Third Outline Level</a:t>
+            </a:r>
+            <a:endParaRPr b="0" lang="en-US" sz="2400" spc="-1" strike="noStrike">
+              <a:latin typeface="Arial"/>
+            </a:endParaRPr>
+          </a:p>
+          <a:p>
+            <a:pPr lvl="3" marL="1728000" indent="-216000">
+              <a:spcBef>
+                <a:spcPts val="567"/>
+              </a:spcBef>
+              <a:buClr>
+                <a:srgbClr val="000000"/>
+              </a:buClr>
+              <a:buSzPct val="75000"/>
+              <a:buFont typeface="Symbol" charset="2"/>
+              <a:buChar char=""/>
+            </a:pPr>
+            <a:r>
+              <a:rPr b="0" lang="en-US" sz="2000" spc="-1" strike="noStrike">
+                <a:latin typeface="Arial"/>
+              </a:rPr>
+              <a:t>Fourth Outline Level</a:t>
+            </a:r>
+            <a:endParaRPr b="0" lang="en-US" sz="2000" spc="-1" strike="noStrike">
+              <a:latin typeface="Arial"/>
+            </a:endParaRPr>
+          </a:p>
+          <a:p>
+            <a:pPr lvl="4" marL="2160000" indent="-216000">
+              <a:spcBef>
+                <a:spcPts val="283"/>
+              </a:spcBef>
+              <a:buClr>
+                <a:srgbClr val="000000"/>
+              </a:buClr>
+              <a:buSzPct val="45000"/>
+              <a:buFont typeface="Wingdings" charset="2"/>
+              <a:buChar char=""/>
+            </a:pPr>
+            <a:r>
+              <a:rPr b="0" lang="en-US" sz="2000" spc="-1" strike="noStrike">
+                <a:latin typeface="Arial"/>
+              </a:rPr>
+              <a:t>Fifth Outline Level</a:t>
+            </a:r>
+            <a:endParaRPr b="0" lang="en-US" sz="2000" spc="-1" strike="noStrike">
+              <a:latin typeface="Arial"/>
+            </a:endParaRPr>
+          </a:p>
+          <a:p>
+            <a:pPr lvl="5" marL="2592000" indent="-216000">
+              <a:spcBef>
+                <a:spcPts val="283"/>
+              </a:spcBef>
+              <a:buClr>
+                <a:srgbClr val="000000"/>
+              </a:buClr>
+              <a:buSzPct val="45000"/>
+              <a:buFont typeface="Wingdings" charset="2"/>
+              <a:buChar char=""/>
+            </a:pPr>
+            <a:r>
+              <a:rPr b="0" lang="en-US" sz="2000" spc="-1" strike="noStrike">
+                <a:latin typeface="Arial"/>
+              </a:rPr>
+              <a:t>Sixth Outline Level</a:t>
+            </a:r>
+            <a:endParaRPr b="0" lang="en-US" sz="2000" spc="-1" strike="noStrike">
+              <a:latin typeface="Arial"/>
+            </a:endParaRPr>
+          </a:p>
+          <a:p>
+            <a:pPr lvl="6" marL="3024000" indent="-216000">
+              <a:spcBef>
+                <a:spcPts val="283"/>
+              </a:spcBef>
+              <a:buClr>
+                <a:srgbClr val="000000"/>
+              </a:buClr>
+              <a:buSzPct val="45000"/>
+              <a:buFont typeface="Wingdings" charset="2"/>
+              <a:buChar char=""/>
+            </a:pPr>
+            <a:r>
+              <a:rPr b="0" lang="en-US" sz="2000" spc="-1" strike="noStrike">
+                <a:latin typeface="Arial"/>
+              </a:rPr>
+              <a:t>Seventh Outline Level</a:t>
+            </a:r>
+            <a:endParaRPr b="0" lang="en-US" sz="2000" spc="-1" strike="noStrike">
               <a:latin typeface="Arial"/>
             </a:endParaRPr>
           </a:p>
@@ -1926,14 +2178,14 @@
       </p:grpSpPr>
       <p:sp>
         <p:nvSpPr>
-          <p:cNvPr id="46" name="CustomShape 1"/>
+          <p:cNvPr id="48" name="CustomShape 1"/>
           <p:cNvSpPr/>
           <p:nvPr/>
         </p:nvSpPr>
         <p:spPr>
           <a:xfrm>
             <a:off x="68400" y="76320"/>
-            <a:ext cx="43728480" cy="3883680"/>
+            <a:ext cx="43728120" cy="3883320"/>
           </a:xfrm>
           <a:prstGeom prst="rect">
             <a:avLst/>
@@ -2002,14 +2254,14 @@
       </p:sp>
       <p:sp>
         <p:nvSpPr>
-          <p:cNvPr id="47" name="CustomShape 2"/>
+          <p:cNvPr id="49" name="CustomShape 2"/>
           <p:cNvSpPr/>
           <p:nvPr/>
         </p:nvSpPr>
         <p:spPr>
           <a:xfrm>
             <a:off x="0" y="4343400"/>
-            <a:ext cx="10355760" cy="1026360"/>
+            <a:ext cx="10355400" cy="1026000"/>
           </a:xfrm>
           <a:prstGeom prst="rect">
             <a:avLst/>
@@ -2058,14 +2310,14 @@
       </p:sp>
       <p:sp>
         <p:nvSpPr>
-          <p:cNvPr id="48" name="CustomShape 3"/>
+          <p:cNvPr id="50" name="CustomShape 3"/>
           <p:cNvSpPr/>
           <p:nvPr/>
         </p:nvSpPr>
         <p:spPr>
           <a:xfrm>
             <a:off x="0" y="11179080"/>
-            <a:ext cx="10355760" cy="1026360"/>
+            <a:ext cx="10355400" cy="1026000"/>
           </a:xfrm>
           <a:prstGeom prst="rect">
             <a:avLst/>
@@ -2114,14 +2366,14 @@
       </p:sp>
       <p:sp>
         <p:nvSpPr>
-          <p:cNvPr id="49" name="CustomShape 4"/>
+          <p:cNvPr id="51" name="CustomShape 4"/>
           <p:cNvSpPr/>
           <p:nvPr/>
         </p:nvSpPr>
         <p:spPr>
           <a:xfrm>
             <a:off x="11177640" y="4343400"/>
-            <a:ext cx="10355760" cy="1026360"/>
+            <a:ext cx="21649320" cy="1026000"/>
           </a:xfrm>
           <a:prstGeom prst="rect">
             <a:avLst/>
@@ -2170,14 +2422,14 @@
       </p:sp>
       <p:sp>
         <p:nvSpPr>
-          <p:cNvPr id="50" name="CustomShape 5"/>
+          <p:cNvPr id="52" name="CustomShape 5"/>
           <p:cNvSpPr/>
           <p:nvPr/>
         </p:nvSpPr>
         <p:spPr>
           <a:xfrm>
-            <a:off x="22355280" y="4343400"/>
-            <a:ext cx="10355760" cy="1026360"/>
+            <a:off x="22131360" y="27592920"/>
+            <a:ext cx="10366560" cy="1026000"/>
           </a:xfrm>
           <a:prstGeom prst="rect">
             <a:avLst/>
@@ -2216,7 +2468,7 @@
                 <a:latin typeface="Arial"/>
                 <a:ea typeface="Arial"/>
               </a:rPr>
-              <a:t>Models</a:t>
+              <a:t>Tech Stack</a:t>
             </a:r>
             <a:endParaRPr b="0" lang="en-US" sz="5700" spc="-1" strike="noStrike">
               <a:latin typeface="Arial"/>
@@ -2226,14 +2478,14 @@
       </p:sp>
       <p:sp>
         <p:nvSpPr>
-          <p:cNvPr id="51" name="CustomShape 6"/>
+          <p:cNvPr id="53" name="CustomShape 6"/>
           <p:cNvSpPr/>
           <p:nvPr/>
         </p:nvSpPr>
         <p:spPr>
           <a:xfrm>
-            <a:off x="22131360" y="27592920"/>
-            <a:ext cx="10366920" cy="1026360"/>
+            <a:off x="33431040" y="16642080"/>
+            <a:ext cx="10355400" cy="1026000"/>
           </a:xfrm>
           <a:prstGeom prst="rect">
             <a:avLst/>
@@ -2272,7 +2524,7 @@
                 <a:latin typeface="Arial"/>
                 <a:ea typeface="Arial"/>
               </a:rPr>
-              <a:t>Tech Stack</a:t>
+              <a:t>Model Comparison</a:t>
             </a:r>
             <a:endParaRPr b="0" lang="en-US" sz="5700" spc="-1" strike="noStrike">
               <a:latin typeface="Arial"/>
@@ -2282,14 +2534,14 @@
       </p:sp>
       <p:sp>
         <p:nvSpPr>
-          <p:cNvPr id="52" name="CustomShape 7"/>
+          <p:cNvPr id="54" name="CustomShape 7"/>
           <p:cNvSpPr/>
           <p:nvPr/>
         </p:nvSpPr>
         <p:spPr>
           <a:xfrm>
-            <a:off x="33431040" y="16642080"/>
-            <a:ext cx="10355760" cy="1026360"/>
+            <a:off x="33442560" y="26816400"/>
+            <a:ext cx="10355400" cy="1026000"/>
           </a:xfrm>
           <a:prstGeom prst="rect">
             <a:avLst/>
@@ -2328,7 +2580,7 @@
                 <a:latin typeface="Arial"/>
                 <a:ea typeface="Arial"/>
               </a:rPr>
-              <a:t>Model Comparison</a:t>
+              <a:t>Conclusions</a:t>
             </a:r>
             <a:endParaRPr b="0" lang="en-US" sz="5700" spc="-1" strike="noStrike">
               <a:latin typeface="Arial"/>
@@ -2338,14 +2590,14 @@
       </p:sp>
       <p:sp>
         <p:nvSpPr>
-          <p:cNvPr id="53" name="CustomShape 8"/>
+          <p:cNvPr id="55" name="CustomShape 8"/>
           <p:cNvSpPr/>
           <p:nvPr/>
         </p:nvSpPr>
         <p:spPr>
           <a:xfrm>
-            <a:off x="33442560" y="26816400"/>
-            <a:ext cx="10355760" cy="1026360"/>
+            <a:off x="0" y="17695080"/>
+            <a:ext cx="10355400" cy="1026000"/>
           </a:xfrm>
           <a:prstGeom prst="rect">
             <a:avLst/>
@@ -2384,7 +2636,7 @@
                 <a:latin typeface="Arial"/>
                 <a:ea typeface="Arial"/>
               </a:rPr>
-              <a:t>Conclusions</a:t>
+              <a:t>Data</a:t>
             </a:r>
             <a:endParaRPr b="0" lang="en-US" sz="5700" spc="-1" strike="noStrike">
               <a:latin typeface="Arial"/>
@@ -2394,70 +2646,14 @@
       </p:sp>
       <p:sp>
         <p:nvSpPr>
-          <p:cNvPr id="54" name="CustomShape 9"/>
+          <p:cNvPr id="56" name="CustomShape 9"/>
           <p:cNvSpPr/>
           <p:nvPr/>
         </p:nvSpPr>
         <p:spPr>
           <a:xfrm>
-            <a:off x="0" y="17695080"/>
-            <a:ext cx="10355760" cy="1026360"/>
-          </a:xfrm>
-          <a:prstGeom prst="rect">
-            <a:avLst/>
-          </a:prstGeom>
-          <a:solidFill>
-            <a:schemeClr val="accent5"/>
-          </a:solidFill>
-          <a:ln w="28440">
-            <a:solidFill>
-              <a:srgbClr val="000000"/>
-            </a:solidFill>
-            <a:round/>
-          </a:ln>
-        </p:spPr>
-        <p:style>
-          <a:lnRef idx="0"/>
-          <a:fillRef idx="0"/>
-          <a:effectRef idx="0"/>
-          <a:fontRef idx="minor"/>
-        </p:style>
-        <p:txBody>
-          <a:bodyPr wrap="none" lIns="137160" rIns="137160" tIns="68760" bIns="68760" anchor="ctr">
-            <a:noAutofit/>
-          </a:bodyPr>
-          <a:p>
-            <a:pPr algn="ctr">
-              <a:lnSpc>
-                <a:spcPct val="100000"/>
-              </a:lnSpc>
-            </a:pPr>
-            <a:r>
-              <a:rPr b="1" lang="en-US" sz="5700" spc="-1" strike="noStrike">
-                <a:solidFill>
-                  <a:srgbClr val="ffffff"/>
-                </a:solidFill>
-                <a:latin typeface="Arial"/>
-                <a:ea typeface="Arial"/>
-              </a:rPr>
-              <a:t>Data</a:t>
-            </a:r>
-            <a:endParaRPr b="0" lang="en-US" sz="5700" spc="-1" strike="noStrike">
-              <a:latin typeface="Arial"/>
-            </a:endParaRPr>
-          </a:p>
-        </p:txBody>
-      </p:sp>
-      <p:sp>
-        <p:nvSpPr>
-          <p:cNvPr id="55" name="CustomShape 10"/>
-          <p:cNvSpPr/>
-          <p:nvPr/>
-        </p:nvSpPr>
-        <p:spPr>
-          <a:xfrm>
             <a:off x="711360" y="5715000"/>
-            <a:ext cx="9446400" cy="5257800"/>
+            <a:ext cx="9446040" cy="5257800"/>
           </a:xfrm>
           <a:prstGeom prst="rect">
             <a:avLst/>
@@ -2504,14 +2700,14 @@
       </p:sp>
       <p:sp>
         <p:nvSpPr>
-          <p:cNvPr id="56" name="CustomShape 11"/>
+          <p:cNvPr id="57" name="CustomShape 10"/>
           <p:cNvSpPr/>
           <p:nvPr/>
         </p:nvSpPr>
         <p:spPr>
           <a:xfrm>
             <a:off x="11277720" y="5715000"/>
-            <a:ext cx="10208880" cy="1684080"/>
+            <a:ext cx="10208520" cy="1684080"/>
           </a:xfrm>
           <a:prstGeom prst="rect">
             <a:avLst/>
@@ -2532,7 +2728,7 @@
             <a:spAutoFit/>
           </a:bodyPr>
           <a:p>
-            <a:pPr marL="216000" indent="-214200">
+            <a:pPr marL="216000" indent="-213840">
               <a:lnSpc>
                 <a:spcPct val="100000"/>
               </a:lnSpc>
@@ -2586,14 +2782,14 @@
       </p:sp>
       <p:sp>
         <p:nvSpPr>
-          <p:cNvPr id="57" name="CustomShape 12"/>
+          <p:cNvPr id="58" name="CustomShape 11"/>
           <p:cNvSpPr/>
           <p:nvPr/>
         </p:nvSpPr>
         <p:spPr>
           <a:xfrm>
             <a:off x="-349200" y="11927880"/>
-            <a:ext cx="9954360" cy="5459400"/>
+            <a:ext cx="9954000" cy="5459400"/>
           </a:xfrm>
           <a:prstGeom prst="rect">
             <a:avLst/>
@@ -2627,7 +2823,7 @@
             </a:endParaRPr>
           </a:p>
           <a:p>
-            <a:pPr lvl="1" marL="1271520" indent="-411840">
+            <a:pPr lvl="1" marL="1271520" indent="-411480">
               <a:lnSpc>
                 <a:spcPct val="100000"/>
               </a:lnSpc>
@@ -2655,7 +2851,7 @@
             </a:endParaRPr>
           </a:p>
           <a:p>
-            <a:pPr lvl="1" marL="1271520" indent="-411840">
+            <a:pPr lvl="1" marL="1271520" indent="-411480">
               <a:lnSpc>
                 <a:spcPct val="100000"/>
               </a:lnSpc>
@@ -2686,14 +2882,14 @@
       </p:sp>
       <p:sp>
         <p:nvSpPr>
-          <p:cNvPr id="58" name="CustomShape 13"/>
+          <p:cNvPr id="59" name="CustomShape 12"/>
           <p:cNvSpPr/>
           <p:nvPr/>
         </p:nvSpPr>
         <p:spPr>
           <a:xfrm>
             <a:off x="33613920" y="17922240"/>
-            <a:ext cx="9964080" cy="1899720"/>
+            <a:ext cx="9963720" cy="1899720"/>
           </a:xfrm>
           <a:prstGeom prst="rect">
             <a:avLst/>
@@ -2737,14 +2933,14 @@
       </p:sp>
       <p:sp>
         <p:nvSpPr>
-          <p:cNvPr id="59" name="CustomShape 14"/>
+          <p:cNvPr id="60" name="CustomShape 13"/>
           <p:cNvSpPr/>
           <p:nvPr/>
         </p:nvSpPr>
         <p:spPr>
           <a:xfrm>
             <a:off x="22302000" y="12877200"/>
-            <a:ext cx="10340280" cy="2283480"/>
+            <a:ext cx="10339920" cy="2283120"/>
           </a:xfrm>
           <a:prstGeom prst="rect">
             <a:avLst/>
@@ -2811,7 +3007,7 @@
       </p:sp>
       <p:pic>
         <p:nvPicPr>
-          <p:cNvPr id="60" name="Picture 2" descr=""/>
+          <p:cNvPr id="61" name="Picture 2" descr=""/>
           <p:cNvPicPr/>
           <p:nvPr/>
         </p:nvPicPr>
@@ -2822,7 +3018,7 @@
         <p:spPr>
           <a:xfrm>
             <a:off x="838080" y="603000"/>
-            <a:ext cx="1521360" cy="2823480"/>
+            <a:ext cx="1521000" cy="2823120"/>
           </a:xfrm>
           <a:prstGeom prst="rect">
             <a:avLst/>
@@ -2834,7 +3030,7 @@
       </p:pic>
       <p:sp>
         <p:nvSpPr>
-          <p:cNvPr id="61" name="CustomShape 15"/>
+          <p:cNvPr id="62" name="CustomShape 14"/>
           <p:cNvSpPr/>
           <p:nvPr/>
         </p:nvSpPr>
@@ -2885,7 +3081,7 @@
       </p:sp>
       <p:pic>
         <p:nvPicPr>
-          <p:cNvPr id="62" name="Picture 387" descr=""/>
+          <p:cNvPr id="63" name="Picture 387" descr=""/>
           <p:cNvPicPr/>
           <p:nvPr/>
         </p:nvPicPr>
@@ -2896,7 +3092,7 @@
         <p:spPr>
           <a:xfrm>
             <a:off x="33022440" y="671400"/>
-            <a:ext cx="697680" cy="697680"/>
+            <a:ext cx="697320" cy="697320"/>
           </a:xfrm>
           <a:prstGeom prst="rect">
             <a:avLst/>
@@ -2908,7 +3104,7 @@
       </p:pic>
       <p:pic>
         <p:nvPicPr>
-          <p:cNvPr id="63" name="Picture 388" descr=""/>
+          <p:cNvPr id="64" name="Picture 388" descr=""/>
           <p:cNvPicPr/>
           <p:nvPr/>
         </p:nvPicPr>
@@ -2919,7 +3115,7 @@
         <p:spPr>
           <a:xfrm>
             <a:off x="33050160" y="2826720"/>
-            <a:ext cx="703800" cy="532080"/>
+            <a:ext cx="703440" cy="531720"/>
           </a:xfrm>
           <a:prstGeom prst="rect">
             <a:avLst/>
@@ -2931,14 +3127,14 @@
       </p:pic>
       <p:sp>
         <p:nvSpPr>
-          <p:cNvPr id="64" name="CustomShape 16"/>
+          <p:cNvPr id="65" name="CustomShape 15"/>
           <p:cNvSpPr/>
           <p:nvPr/>
         </p:nvSpPr>
         <p:spPr>
           <a:xfrm>
             <a:off x="33070680" y="1600200"/>
-            <a:ext cx="1292760" cy="912600"/>
+            <a:ext cx="1292400" cy="912600"/>
           </a:xfrm>
           <a:prstGeom prst="rect">
             <a:avLst/>
@@ -2982,7 +3178,7 @@
       </p:sp>
       <p:sp>
         <p:nvSpPr>
-          <p:cNvPr id="65" name="CustomShape 17"/>
+          <p:cNvPr id="66" name="CustomShape 16"/>
           <p:cNvSpPr/>
           <p:nvPr/>
         </p:nvSpPr>
@@ -3033,7 +3229,7 @@
       </p:sp>
       <p:sp>
         <p:nvSpPr>
-          <p:cNvPr id="66" name="CustomShape 18"/>
+          <p:cNvPr id="67" name="CustomShape 17"/>
           <p:cNvSpPr/>
           <p:nvPr/>
         </p:nvSpPr>
@@ -3084,14 +3280,14 @@
       </p:sp>
       <p:sp>
         <p:nvSpPr>
-          <p:cNvPr id="67" name="CustomShape 19"/>
+          <p:cNvPr id="68" name="CustomShape 18"/>
           <p:cNvSpPr/>
           <p:nvPr/>
         </p:nvSpPr>
         <p:spPr>
           <a:xfrm>
             <a:off x="742320" y="19227600"/>
-            <a:ext cx="9497160" cy="6206040"/>
+            <a:ext cx="9496800" cy="6206040"/>
           </a:xfrm>
           <a:prstGeom prst="rect">
             <a:avLst/>
@@ -3138,14 +3334,14 @@
       </p:sp>
       <p:sp>
         <p:nvSpPr>
-          <p:cNvPr id="68" name="CustomShape 20"/>
+          <p:cNvPr id="69" name="CustomShape 19"/>
           <p:cNvSpPr/>
           <p:nvPr/>
         </p:nvSpPr>
         <p:spPr>
           <a:xfrm>
             <a:off x="11155680" y="6503400"/>
-            <a:ext cx="10360800" cy="1268280"/>
+            <a:ext cx="10360440" cy="1268280"/>
           </a:xfrm>
           <a:prstGeom prst="rect">
             <a:avLst/>
@@ -3192,14 +3388,14 @@
       </p:sp>
       <p:sp>
         <p:nvSpPr>
-          <p:cNvPr id="69" name="CustomShape 21"/>
+          <p:cNvPr id="70" name="CustomShape 20"/>
           <p:cNvSpPr/>
           <p:nvPr/>
         </p:nvSpPr>
         <p:spPr>
           <a:xfrm>
-            <a:off x="11277720" y="16285680"/>
-            <a:ext cx="10208880" cy="777240"/>
+            <a:off x="11264760" y="15766200"/>
+            <a:ext cx="10208520" cy="777240"/>
           </a:xfrm>
           <a:prstGeom prst="rect">
             <a:avLst/>
@@ -3220,7 +3416,7 @@
             <a:spAutoFit/>
           </a:bodyPr>
           <a:p>
-            <a:pPr marL="216000" indent="-214200">
+            <a:pPr marL="216000" indent="-213840">
               <a:lnSpc>
                 <a:spcPct val="100000"/>
               </a:lnSpc>
@@ -3261,14 +3457,14 @@
       </p:sp>
       <p:sp>
         <p:nvSpPr>
-          <p:cNvPr id="70" name="CustomShape 22"/>
+          <p:cNvPr id="71" name="CustomShape 21"/>
           <p:cNvSpPr/>
           <p:nvPr/>
         </p:nvSpPr>
         <p:spPr>
           <a:xfrm>
-            <a:off x="11237760" y="17130240"/>
-            <a:ext cx="10157400" cy="2283480"/>
+            <a:off x="11224800" y="16610760"/>
+            <a:ext cx="10157040" cy="2283120"/>
           </a:xfrm>
           <a:prstGeom prst="rect">
             <a:avLst/>
@@ -3305,7 +3501,7 @@
                 <a:latin typeface="Gill Sans"/>
                 <a:ea typeface="Arial"/>
               </a:rPr>
-              <a:t>Five-fold cross validation provided a best random forest model with 160 trees. The four most important features affect predicted rates by as much as 20%.</a:t>
+              <a:t>Partial dependence plots for the four most important features are shown. Higher test benchmarks, fewer Pell Grants, and more selective admissions correlate with higher graduation rates.</a:t>
             </a:r>
             <a:endParaRPr b="0" lang="en-US" sz="3600" spc="-1" strike="noStrike">
               <a:latin typeface="Arial"/>
@@ -3315,14 +3511,14 @@
       </p:sp>
       <p:sp>
         <p:nvSpPr>
-          <p:cNvPr id="71" name="CustomShape 23"/>
+          <p:cNvPr id="72" name="CustomShape 22"/>
           <p:cNvSpPr/>
           <p:nvPr/>
         </p:nvSpPr>
         <p:spPr>
           <a:xfrm>
             <a:off x="22368600" y="12000960"/>
-            <a:ext cx="10208880" cy="777240"/>
+            <a:ext cx="10208520" cy="777240"/>
           </a:xfrm>
           <a:prstGeom prst="rect">
             <a:avLst/>
@@ -3343,7 +3539,7 @@
             <a:spAutoFit/>
           </a:bodyPr>
           <a:p>
-            <a:pPr marL="216000" indent="-214200">
+            <a:pPr marL="216000" indent="-213840">
               <a:lnSpc>
                 <a:spcPct val="100000"/>
               </a:lnSpc>
@@ -3384,14 +3580,14 @@
       </p:sp>
       <p:sp>
         <p:nvSpPr>
-          <p:cNvPr id="72" name="CustomShape 24"/>
+          <p:cNvPr id="73" name="CustomShape 23"/>
           <p:cNvSpPr/>
           <p:nvPr/>
         </p:nvSpPr>
         <p:spPr>
           <a:xfrm>
             <a:off x="33764040" y="28208160"/>
-            <a:ext cx="9684360" cy="4313160"/>
+            <a:ext cx="9684000" cy="4313160"/>
           </a:xfrm>
           <a:prstGeom prst="rect">
             <a:avLst/>
@@ -3435,14 +3631,14 @@
       </p:sp>
       <p:sp>
         <p:nvSpPr>
-          <p:cNvPr id="73" name="CustomShape 25"/>
+          <p:cNvPr id="74" name="CustomShape 24"/>
           <p:cNvSpPr/>
           <p:nvPr/>
         </p:nvSpPr>
         <p:spPr>
           <a:xfrm>
             <a:off x="33684120" y="4333680"/>
-            <a:ext cx="9989640" cy="1026360"/>
+            <a:ext cx="9989280" cy="1026000"/>
           </a:xfrm>
           <a:prstGeom prst="rect">
             <a:avLst/>
@@ -3491,7 +3687,7 @@
       </p:sp>
       <p:pic>
         <p:nvPicPr>
-          <p:cNvPr id="74" name="" descr=""/>
+          <p:cNvPr id="75" name="" descr=""/>
           <p:cNvPicPr/>
           <p:nvPr/>
         </p:nvPicPr>
@@ -3502,30 +3698,7 @@
         <p:spPr>
           <a:xfrm>
             <a:off x="22128480" y="31377600"/>
-            <a:ext cx="3884400" cy="807840"/>
-          </a:xfrm>
-          <a:prstGeom prst="rect">
-            <a:avLst/>
-          </a:prstGeom>
-          <a:ln>
-            <a:noFill/>
-          </a:ln>
-        </p:spPr>
-      </p:pic>
-      <p:pic>
-        <p:nvPicPr>
-          <p:cNvPr id="75" name="" descr=""/>
-          <p:cNvPicPr/>
-          <p:nvPr/>
-        </p:nvPicPr>
-        <p:blipFill>
-          <a:blip r:embed="rId5"/>
-          <a:stretch/>
-        </p:blipFill>
-        <p:spPr>
-          <a:xfrm>
-            <a:off x="22402800" y="28803600"/>
-            <a:ext cx="3179880" cy="1073160"/>
+            <a:ext cx="3884040" cy="807480"/>
           </a:xfrm>
           <a:prstGeom prst="rect">
             <a:avLst/>
@@ -3542,13 +3715,13 @@
           <p:nvPr/>
         </p:nvPicPr>
         <p:blipFill>
-          <a:blip r:embed="rId6"/>
+          <a:blip r:embed="rId5"/>
           <a:stretch/>
         </p:blipFill>
         <p:spPr>
           <a:xfrm>
-            <a:off x="22774680" y="30041640"/>
-            <a:ext cx="2644200" cy="1046520"/>
+            <a:off x="22402800" y="28803600"/>
+            <a:ext cx="3179520" cy="1072800"/>
           </a:xfrm>
           <a:prstGeom prst="rect">
             <a:avLst/>
@@ -3565,13 +3738,13 @@
           <p:nvPr/>
         </p:nvPicPr>
         <p:blipFill>
-          <a:blip r:embed="rId7"/>
+          <a:blip r:embed="rId6"/>
           <a:stretch/>
         </p:blipFill>
         <p:spPr>
           <a:xfrm>
-            <a:off x="26517600" y="28803600"/>
-            <a:ext cx="2004840" cy="1078560"/>
+            <a:off x="22774680" y="30041640"/>
+            <a:ext cx="2643840" cy="1046160"/>
           </a:xfrm>
           <a:prstGeom prst="rect">
             <a:avLst/>
@@ -3588,13 +3761,13 @@
           <p:nvPr/>
         </p:nvPicPr>
         <p:blipFill>
-          <a:blip r:embed="rId8"/>
+          <a:blip r:embed="rId7"/>
           <a:stretch/>
         </p:blipFill>
         <p:spPr>
           <a:xfrm>
-            <a:off x="26151840" y="30165840"/>
-            <a:ext cx="3087720" cy="739440"/>
+            <a:off x="26517600" y="28803600"/>
+            <a:ext cx="2004480" cy="1078200"/>
           </a:xfrm>
           <a:prstGeom prst="rect">
             <a:avLst/>
@@ -3611,13 +3784,13 @@
           <p:nvPr/>
         </p:nvPicPr>
         <p:blipFill>
-          <a:blip r:embed="rId9"/>
+          <a:blip r:embed="rId8"/>
           <a:stretch/>
         </p:blipFill>
         <p:spPr>
           <a:xfrm>
-            <a:off x="29626560" y="28924560"/>
-            <a:ext cx="2482200" cy="883440"/>
+            <a:off x="26151840" y="30165840"/>
+            <a:ext cx="3087360" cy="739080"/>
           </a:xfrm>
           <a:prstGeom prst="rect">
             <a:avLst/>
@@ -3634,13 +3807,13 @@
           <p:nvPr/>
         </p:nvPicPr>
         <p:blipFill>
-          <a:blip r:embed="rId10"/>
+          <a:blip r:embed="rId9"/>
           <a:stretch/>
         </p:blipFill>
         <p:spPr>
           <a:xfrm>
-            <a:off x="29432880" y="29986560"/>
-            <a:ext cx="2935440" cy="1140480"/>
+            <a:off x="29626560" y="28924560"/>
+            <a:ext cx="2481840" cy="883080"/>
           </a:xfrm>
           <a:prstGeom prst="rect">
             <a:avLst/>
@@ -3657,13 +3830,13 @@
           <p:nvPr/>
         </p:nvPicPr>
         <p:blipFill>
-          <a:blip r:embed="rId11"/>
+          <a:blip r:embed="rId10"/>
           <a:stretch/>
         </p:blipFill>
         <p:spPr>
           <a:xfrm>
-            <a:off x="26954640" y="31164480"/>
-            <a:ext cx="1847520" cy="1385280"/>
+            <a:off x="29432880" y="29986560"/>
+            <a:ext cx="2935080" cy="1140120"/>
           </a:xfrm>
           <a:prstGeom prst="rect">
             <a:avLst/>
@@ -3680,14 +3853,13 @@
           <p:nvPr/>
         </p:nvPicPr>
         <p:blipFill>
-          <a:blip r:embed="rId12"/>
-          <a:srcRect l="0" t="10526" r="0" b="20999"/>
+          <a:blip r:embed="rId11"/>
           <a:stretch/>
         </p:blipFill>
         <p:spPr>
           <a:xfrm>
-            <a:off x="29556720" y="31272480"/>
-            <a:ext cx="2811600" cy="1186920"/>
+            <a:off x="26954640" y="31164480"/>
+            <a:ext cx="1847160" cy="1384920"/>
           </a:xfrm>
           <a:prstGeom prst="rect">
             <a:avLst/>
@@ -3704,13 +3876,37 @@
           <p:nvPr/>
         </p:nvPicPr>
         <p:blipFill>
+          <a:blip r:embed="rId12"/>
+          <a:srcRect l="0" t="10526" r="0" b="20999"/>
+          <a:stretch/>
+        </p:blipFill>
+        <p:spPr>
+          <a:xfrm>
+            <a:off x="29556720" y="31272480"/>
+            <a:ext cx="2811240" cy="1186560"/>
+          </a:xfrm>
+          <a:prstGeom prst="rect">
+            <a:avLst/>
+          </a:prstGeom>
+          <a:ln>
+            <a:noFill/>
+          </a:ln>
+        </p:spPr>
+      </p:pic>
+      <p:pic>
+        <p:nvPicPr>
+          <p:cNvPr id="84" name="" descr=""/>
+          <p:cNvPicPr/>
+          <p:nvPr/>
+        </p:nvPicPr>
+        <p:blipFill>
           <a:blip r:embed="rId13"/>
           <a:stretch/>
         </p:blipFill>
         <p:spPr>
           <a:xfrm>
             <a:off x="34254000" y="20212920"/>
-            <a:ext cx="8777160" cy="6266520"/>
+            <a:ext cx="8776800" cy="6266160"/>
           </a:xfrm>
           <a:prstGeom prst="rect">
             <a:avLst/>
@@ -3722,28 +3918,28 @@
       </p:pic>
       <p:grpSp>
         <p:nvGrpSpPr>
-          <p:cNvPr id="84" name="Group 26"/>
+          <p:cNvPr id="85" name="Group 25"/>
           <p:cNvGrpSpPr/>
           <p:nvPr/>
         </p:nvGrpSpPr>
         <p:grpSpPr>
           <a:xfrm>
             <a:off x="33284160" y="5669280"/>
-            <a:ext cx="10114200" cy="10716840"/>
+            <a:ext cx="10113840" cy="10716480"/>
             <a:chOff x="33284160" y="5669280"/>
-            <a:chExt cx="10114200" cy="10716840"/>
+            <a:chExt cx="10113840" cy="10716480"/>
           </a:xfrm>
         </p:grpSpPr>
         <p:sp>
           <p:nvSpPr>
-            <p:cNvPr id="85" name="CustomShape 27"/>
+            <p:cNvPr id="86" name="CustomShape 26"/>
             <p:cNvSpPr/>
             <p:nvPr/>
           </p:nvSpPr>
           <p:spPr>
             <a:xfrm>
               <a:off x="35478720" y="5669280"/>
-              <a:ext cx="6948000" cy="597600"/>
+              <a:ext cx="6947640" cy="597600"/>
             </a:xfrm>
             <a:prstGeom prst="rect">
               <a:avLst/>
@@ -3790,7 +3986,7 @@
         </p:sp>
         <p:pic>
           <p:nvPicPr>
-            <p:cNvPr id="86" name="" descr=""/>
+            <p:cNvPr id="87" name="" descr=""/>
             <p:cNvPicPr/>
             <p:nvPr/>
           </p:nvPicPr>
@@ -3802,7 +3998,7 @@
           <p:spPr>
             <a:xfrm>
               <a:off x="33284160" y="6511680"/>
-              <a:ext cx="10114200" cy="9874440"/>
+              <a:ext cx="10113840" cy="9874080"/>
             </a:xfrm>
             <a:prstGeom prst="rect">
               <a:avLst/>
@@ -3815,7 +4011,7 @@
       </p:grpSp>
       <p:pic>
         <p:nvPicPr>
-          <p:cNvPr id="87" name="" descr=""/>
+          <p:cNvPr id="88" name="" descr=""/>
           <p:cNvPicPr/>
           <p:nvPr/>
         </p:nvPicPr>
@@ -3826,7 +4022,7 @@
         <p:spPr>
           <a:xfrm>
             <a:off x="11887200" y="25957080"/>
-            <a:ext cx="9509760" cy="6369840"/>
+            <a:ext cx="9509400" cy="6369480"/>
           </a:xfrm>
           <a:prstGeom prst="rect">
             <a:avLst/>
@@ -3838,28 +4034,28 @@
       </p:pic>
       <p:grpSp>
         <p:nvGrpSpPr>
-          <p:cNvPr id="88" name="Group 28"/>
+          <p:cNvPr id="89" name="Group 27"/>
           <p:cNvGrpSpPr/>
           <p:nvPr/>
         </p:nvGrpSpPr>
         <p:grpSpPr>
           <a:xfrm>
             <a:off x="10344600" y="7950600"/>
-            <a:ext cx="11346480" cy="7680600"/>
+            <a:ext cx="11346120" cy="7680240"/>
             <a:chOff x="10344600" y="7950600"/>
-            <a:chExt cx="11346480" cy="7680600"/>
+            <a:chExt cx="11346120" cy="7680240"/>
           </a:xfrm>
         </p:grpSpPr>
         <p:sp>
           <p:nvSpPr>
-            <p:cNvPr id="89" name="CustomShape 29"/>
+            <p:cNvPr id="90" name="CustomShape 28"/>
             <p:cNvSpPr/>
             <p:nvPr/>
           </p:nvSpPr>
           <p:spPr>
             <a:xfrm>
               <a:off x="13339800" y="7950600"/>
-              <a:ext cx="7039080" cy="597600"/>
+              <a:ext cx="7038720" cy="597600"/>
             </a:xfrm>
             <a:prstGeom prst="rect">
               <a:avLst/>
@@ -3906,7 +4102,7 @@
         </p:sp>
         <p:pic>
           <p:nvPicPr>
-            <p:cNvPr id="90" name="" descr=""/>
+            <p:cNvPr id="91" name="" descr=""/>
             <p:cNvPicPr/>
             <p:nvPr/>
           </p:nvPicPr>
@@ -3918,7 +4114,7 @@
           <p:spPr>
             <a:xfrm>
               <a:off x="10344600" y="8499240"/>
-              <a:ext cx="11346480" cy="7131960"/>
+              <a:ext cx="11346120" cy="7131600"/>
             </a:xfrm>
             <a:prstGeom prst="rect">
               <a:avLst/>
@@ -3931,28 +4127,28 @@
       </p:grpSp>
       <p:grpSp>
         <p:nvGrpSpPr>
-          <p:cNvPr id="91" name="Group 30"/>
+          <p:cNvPr id="92" name="Group 29"/>
           <p:cNvGrpSpPr/>
           <p:nvPr/>
         </p:nvGrpSpPr>
         <p:grpSpPr>
           <a:xfrm>
             <a:off x="21949920" y="16410240"/>
-            <a:ext cx="10510920" cy="10845360"/>
+            <a:ext cx="10510560" cy="10845000"/>
             <a:chOff x="21949920" y="16410240"/>
-            <a:chExt cx="10510920" cy="10845360"/>
+            <a:chExt cx="10510560" cy="10845000"/>
           </a:xfrm>
         </p:grpSpPr>
         <p:sp>
           <p:nvSpPr>
-            <p:cNvPr id="92" name="CustomShape 31"/>
+            <p:cNvPr id="93" name="CustomShape 30"/>
             <p:cNvSpPr/>
             <p:nvPr/>
           </p:nvSpPr>
           <p:spPr>
             <a:xfrm>
               <a:off x="23225760" y="16410240"/>
-              <a:ext cx="8344800" cy="597600"/>
+              <a:ext cx="8344440" cy="597600"/>
             </a:xfrm>
             <a:prstGeom prst="rect">
               <a:avLst/>
@@ -3999,7 +4195,7 @@
         </p:sp>
         <p:pic>
           <p:nvPicPr>
-            <p:cNvPr id="93" name="" descr=""/>
+            <p:cNvPr id="94" name="" descr=""/>
             <p:cNvPicPr/>
             <p:nvPr/>
           </p:nvPicPr>
@@ -4011,7 +4207,7 @@
           <p:spPr>
             <a:xfrm>
               <a:off x="21949920" y="17099280"/>
-              <a:ext cx="10510920" cy="10156320"/>
+              <a:ext cx="10510560" cy="10155960"/>
             </a:xfrm>
             <a:prstGeom prst="rect">
               <a:avLst/>
@@ -4024,28 +4220,28 @@
       </p:grpSp>
       <p:grpSp>
         <p:nvGrpSpPr>
-          <p:cNvPr id="94" name="Group 32"/>
+          <p:cNvPr id="95" name="Group 31"/>
           <p:cNvGrpSpPr/>
           <p:nvPr/>
         </p:nvGrpSpPr>
         <p:grpSpPr>
           <a:xfrm>
             <a:off x="10885680" y="19571040"/>
-            <a:ext cx="10876680" cy="6031440"/>
+            <a:ext cx="10876320" cy="6031080"/>
             <a:chOff x="10885680" y="19571040"/>
-            <a:chExt cx="10876680" cy="6031440"/>
+            <a:chExt cx="10876320" cy="6031080"/>
           </a:xfrm>
         </p:grpSpPr>
         <p:sp>
           <p:nvSpPr>
-            <p:cNvPr id="95" name="CustomShape 33"/>
+            <p:cNvPr id="96" name="CustomShape 32"/>
             <p:cNvSpPr/>
             <p:nvPr/>
           </p:nvSpPr>
           <p:spPr>
             <a:xfrm>
               <a:off x="13529160" y="19571040"/>
-              <a:ext cx="5784480" cy="597600"/>
+              <a:ext cx="5784120" cy="597600"/>
             </a:xfrm>
             <a:prstGeom prst="rect">
               <a:avLst/>
@@ -4092,19 +4288,19 @@
         </p:sp>
         <p:pic>
           <p:nvPicPr>
-            <p:cNvPr id="96" name="" descr=""/>
+            <p:cNvPr id="97" name="" descr=""/>
             <p:cNvPicPr/>
             <p:nvPr/>
           </p:nvPicPr>
           <p:blipFill>
             <a:blip r:embed="rId18"/>
-            <a:srcRect l="0" t="0" r="0" b="50224"/>
+            <a:srcRect l="0" t="0" r="0" b="50217"/>
             <a:stretch/>
           </p:blipFill>
           <p:spPr>
             <a:xfrm>
               <a:off x="10885680" y="20194560"/>
-              <a:ext cx="10876680" cy="5407920"/>
+              <a:ext cx="10876320" cy="5407560"/>
             </a:xfrm>
             <a:prstGeom prst="rect">
               <a:avLst/>
@@ -4117,28 +4313,28 @@
       </p:grpSp>
       <p:grpSp>
         <p:nvGrpSpPr>
-          <p:cNvPr id="97" name="Group 34"/>
+          <p:cNvPr id="98" name="Group 33"/>
           <p:cNvGrpSpPr/>
           <p:nvPr/>
         </p:nvGrpSpPr>
         <p:grpSpPr>
           <a:xfrm>
             <a:off x="22110480" y="5652720"/>
-            <a:ext cx="10876680" cy="6087960"/>
+            <a:ext cx="10876320" cy="6087600"/>
             <a:chOff x="22110480" y="5652720"/>
-            <a:chExt cx="10876680" cy="6087960"/>
+            <a:chExt cx="10876320" cy="6087600"/>
           </a:xfrm>
         </p:grpSpPr>
         <p:sp>
           <p:nvSpPr>
-            <p:cNvPr id="98" name="CustomShape 35"/>
+            <p:cNvPr id="99" name="CustomShape 34"/>
             <p:cNvSpPr/>
             <p:nvPr/>
           </p:nvSpPr>
           <p:spPr>
             <a:xfrm>
               <a:off x="24916320" y="5652720"/>
-              <a:ext cx="5684400" cy="597600"/>
+              <a:ext cx="5684040" cy="597600"/>
             </a:xfrm>
             <a:prstGeom prst="rect">
               <a:avLst/>
@@ -4185,19 +4381,19 @@
         </p:sp>
         <p:pic>
           <p:nvPicPr>
-            <p:cNvPr id="99" name="" descr=""/>
+            <p:cNvPr id="100" name="" descr=""/>
             <p:cNvPicPr/>
             <p:nvPr/>
           </p:nvPicPr>
           <p:blipFill>
             <a:blip r:embed="rId19"/>
-            <a:srcRect l="0" t="49498" r="0" b="0"/>
+            <a:srcRect l="0" t="49492" r="0" b="0"/>
             <a:stretch/>
           </p:blipFill>
           <p:spPr>
             <a:xfrm>
               <a:off x="22110480" y="6253920"/>
-              <a:ext cx="10876680" cy="5486760"/>
+              <a:ext cx="10876320" cy="5486400"/>
             </a:xfrm>
             <a:prstGeom prst="rect">
               <a:avLst/>
@@ -4210,7 +4406,7 @@
       </p:grpSp>
       <p:pic>
         <p:nvPicPr>
-          <p:cNvPr id="100" name="" descr=""/>
+          <p:cNvPr id="101" name="" descr=""/>
           <p:cNvPicPr/>
           <p:nvPr/>
         </p:nvPicPr>
@@ -4221,7 +4417,7 @@
         <p:spPr>
           <a:xfrm>
             <a:off x="965160" y="25985160"/>
-            <a:ext cx="11013480" cy="6359400"/>
+            <a:ext cx="11013120" cy="6359040"/>
           </a:xfrm>
           <a:prstGeom prst="rect">
             <a:avLst/>

</xml_diff>